<commit_message>
Adding basic outline for the talk
</commit_message>
<xml_diff>
--- a/thomas-android/src/main/presentations/Unit Testing.pptx
+++ b/thomas-android/src/main/presentations/Unit Testing.pptx
@@ -5,13 +5,23 @@
     <p:sldMasterId id="2147484272" r:id="rId1"/>
   </p:sldMasterIdLst>
   <p:notesMasterIdLst>
-    <p:notesMasterId r:id="rId3"/>
+    <p:notesMasterId r:id="rId13"/>
   </p:notesMasterIdLst>
   <p:handoutMasterIdLst>
-    <p:handoutMasterId r:id="rId4"/>
+    <p:handoutMasterId r:id="rId14"/>
   </p:handoutMasterIdLst>
   <p:sldIdLst>
     <p:sldId id="256" r:id="rId2"/>
+    <p:sldId id="257" r:id="rId3"/>
+    <p:sldId id="258" r:id="rId4"/>
+    <p:sldId id="259" r:id="rId5"/>
+    <p:sldId id="265" r:id="rId6"/>
+    <p:sldId id="264" r:id="rId7"/>
+    <p:sldId id="266" r:id="rId8"/>
+    <p:sldId id="263" r:id="rId9"/>
+    <p:sldId id="261" r:id="rId10"/>
+    <p:sldId id="260" r:id="rId11"/>
+    <p:sldId id="262" r:id="rId12"/>
   </p:sldIdLst>
   <p:sldSz cx="9144000" cy="6858000" type="screen4x3"/>
   <p:notesSz cx="6858000" cy="9144000"/>
@@ -195,7 +205,8 @@
           <a:p>
             <a:fld id="{DA076EBB-1C5E-334A-B4F8-1D7B3B403335}" type="datetimeFigureOut">
               <a:rPr lang="en-US" smtClean="0"/>
-              <a:t>10/7/12</a:t>
+              <a:pPr/>
+              <a:t>10/11/12</a:t>
             </a:fld>
             <a:endParaRPr lang="en-US"/>
           </a:p>
@@ -261,6 +272,7 @@
           <a:p>
             <a:fld id="{8DF2D10C-F6D1-E747-94F1-50C63C38B15B}" type="slidenum">
               <a:rPr lang="en-US" smtClean="0"/>
+              <a:pPr/>
               <a:t>‹#›</a:t>
             </a:fld>
             <a:endParaRPr lang="en-US"/>
@@ -355,7 +367,8 @@
           <a:p>
             <a:fld id="{A2404591-B34B-CF4C-BA40-6A959E540D05}" type="datetimeFigureOut">
               <a:rPr lang="en-US" smtClean="0"/>
-              <a:t>10/7/12</a:t>
+              <a:pPr/>
+              <a:t>10/11/12</a:t>
             </a:fld>
             <a:endParaRPr lang="en-US"/>
           </a:p>
@@ -516,6 +529,7 @@
           <a:p>
             <a:fld id="{35D29BC8-E804-EA44-A2C1-31832AE6737B}" type="slidenum">
               <a:rPr lang="en-US" smtClean="0"/>
+              <a:pPr/>
               <a:t>‹#›</a:t>
             </a:fld>
             <a:endParaRPr lang="en-US"/>
@@ -937,7 +951,7 @@
             <a:fld id="{0106B4A3-4212-4E39-93DE-E053E8F69C28}" type="datetimeFigureOut">
               <a:rPr lang="en-US" smtClean="0"/>
               <a:pPr/>
-              <a:t>10/7/12</a:t>
+              <a:t>10/11/12</a:t>
             </a:fld>
             <a:endParaRPr lang="en-US"/>
           </a:p>
@@ -1245,7 +1259,8 @@
           <a:p>
             <a:fld id="{B0C38071-61E7-2B4E-B2A4-01D49E5FA634}" type="datetimeFigureOut">
               <a:rPr lang="en-US" smtClean="0"/>
-              <a:t>10/7/12</a:t>
+              <a:pPr/>
+              <a:t>10/11/12</a:t>
             </a:fld>
             <a:endParaRPr lang="en-US"/>
           </a:p>
@@ -1535,7 +1550,8 @@
           <a:p>
             <a:fld id="{B0C38071-61E7-2B4E-B2A4-01D49E5FA634}" type="datetimeFigureOut">
               <a:rPr lang="en-US" smtClean="0"/>
-              <a:t>10/7/12</a:t>
+              <a:pPr/>
+              <a:t>10/11/12</a:t>
             </a:fld>
             <a:endParaRPr lang="en-US"/>
           </a:p>
@@ -1585,6 +1601,7 @@
           <a:p>
             <a:fld id="{690E99A7-3422-3F4E-AC0B-3875C0E10C8A}" type="slidenum">
               <a:rPr lang="en-US" smtClean="0"/>
+              <a:pPr/>
               <a:t>‹#›</a:t>
             </a:fld>
             <a:endParaRPr lang="en-US"/>
@@ -1712,7 +1729,8 @@
           <a:p>
             <a:fld id="{B0C38071-61E7-2B4E-B2A4-01D49E5FA634}" type="datetimeFigureOut">
               <a:rPr lang="en-US" smtClean="0"/>
-              <a:t>10/7/12</a:t>
+              <a:pPr/>
+              <a:t>10/11/12</a:t>
             </a:fld>
             <a:endParaRPr lang="en-US"/>
           </a:p>
@@ -1762,6 +1780,7 @@
           <a:p>
             <a:fld id="{690E99A7-3422-3F4E-AC0B-3875C0E10C8A}" type="slidenum">
               <a:rPr lang="en-US" smtClean="0"/>
+              <a:pPr/>
               <a:t>‹#›</a:t>
             </a:fld>
             <a:endParaRPr lang="en-US"/>
@@ -1895,7 +1914,8 @@
           <a:p>
             <a:fld id="{B0C38071-61E7-2B4E-B2A4-01D49E5FA634}" type="datetimeFigureOut">
               <a:rPr lang="en-US" smtClean="0"/>
-              <a:t>10/7/12</a:t>
+              <a:pPr/>
+              <a:t>10/11/12</a:t>
             </a:fld>
             <a:endParaRPr lang="en-US"/>
           </a:p>
@@ -1950,6 +1970,7 @@
           <a:p>
             <a:fld id="{690E99A7-3422-3F4E-AC0B-3875C0E10C8A}" type="slidenum">
               <a:rPr lang="en-US" smtClean="0"/>
+              <a:pPr/>
               <a:t>‹#›</a:t>
             </a:fld>
             <a:endParaRPr lang="en-US"/>
@@ -2104,7 +2125,8 @@
           <a:p>
             <a:fld id="{B0C38071-61E7-2B4E-B2A4-01D49E5FA634}" type="datetimeFigureOut">
               <a:rPr lang="en-US" smtClean="0"/>
-              <a:t>10/7/12</a:t>
+              <a:pPr/>
+              <a:t>10/11/12</a:t>
             </a:fld>
             <a:endParaRPr lang="en-US"/>
           </a:p>
@@ -2138,6 +2160,7 @@
           <a:p>
             <a:fld id="{690E99A7-3422-3F4E-AC0B-3875C0E10C8A}" type="slidenum">
               <a:rPr lang="en-US" smtClean="0"/>
+              <a:pPr/>
               <a:t>‹#›</a:t>
             </a:fld>
             <a:endParaRPr lang="en-US"/>
@@ -2443,7 +2466,8 @@
           <a:p>
             <a:fld id="{B0C38071-61E7-2B4E-B2A4-01D49E5FA634}" type="datetimeFigureOut">
               <a:rPr lang="en-US" smtClean="0"/>
-              <a:t>10/7/12</a:t>
+              <a:pPr/>
+              <a:t>10/11/12</a:t>
             </a:fld>
             <a:endParaRPr lang="en-US"/>
           </a:p>
@@ -2665,6 +2689,7 @@
           <a:p>
             <a:fld id="{690E99A7-3422-3F4E-AC0B-3875C0E10C8A}" type="slidenum">
               <a:rPr lang="en-US" smtClean="0"/>
+              <a:pPr/>
               <a:t>‹#›</a:t>
             </a:fld>
             <a:endParaRPr lang="en-US"/>
@@ -2833,7 +2858,8 @@
           <a:p>
             <a:fld id="{B0C38071-61E7-2B4E-B2A4-01D49E5FA634}" type="datetimeFigureOut">
               <a:rPr lang="en-US" smtClean="0"/>
-              <a:t>10/7/12</a:t>
+              <a:pPr/>
+              <a:t>10/11/12</a:t>
             </a:fld>
             <a:endParaRPr lang="en-US"/>
           </a:p>
@@ -2867,6 +2893,7 @@
           <a:p>
             <a:fld id="{690E99A7-3422-3F4E-AC0B-3875C0E10C8A}" type="slidenum">
               <a:rPr lang="en-US" smtClean="0"/>
+              <a:pPr/>
               <a:t>‹#›</a:t>
             </a:fld>
             <a:endParaRPr lang="en-US"/>
@@ -3208,7 +3235,7 @@
             <a:fld id="{74CBEAF9-9E58-4CC8-A6FF-6DD8A58DEEA4}" type="datetimeFigureOut">
               <a:rPr lang="en-US" smtClean="0"/>
               <a:pPr/>
-              <a:t>10/7/12</a:t>
+              <a:t>10/11/12</a:t>
             </a:fld>
             <a:endParaRPr lang="en-US"/>
           </a:p>
@@ -3515,7 +3542,8 @@
           <a:p>
             <a:fld id="{B0C38071-61E7-2B4E-B2A4-01D49E5FA634}" type="datetimeFigureOut">
               <a:rPr lang="en-US" smtClean="0"/>
-              <a:t>10/7/12</a:t>
+              <a:pPr/>
+              <a:t>10/11/12</a:t>
             </a:fld>
             <a:endParaRPr lang="en-US"/>
           </a:p>
@@ -3565,6 +3593,7 @@
           <a:p>
             <a:fld id="{690E99A7-3422-3F4E-AC0B-3875C0E10C8A}" type="slidenum">
               <a:rPr lang="en-US" smtClean="0"/>
+              <a:pPr/>
               <a:t>‹#›</a:t>
             </a:fld>
             <a:endParaRPr lang="en-US"/>
@@ -4186,7 +4215,8 @@
           <a:p>
             <a:fld id="{B0C38071-61E7-2B4E-B2A4-01D49E5FA634}" type="datetimeFigureOut">
               <a:rPr lang="en-US" smtClean="0"/>
-              <a:t>10/7/12</a:t>
+              <a:pPr/>
+              <a:t>10/11/12</a:t>
             </a:fld>
             <a:endParaRPr lang="en-US"/>
           </a:p>
@@ -4236,6 +4266,7 @@
           <a:p>
             <a:fld id="{690E99A7-3422-3F4E-AC0B-3875C0E10C8A}" type="slidenum">
               <a:rPr lang="en-US" smtClean="0"/>
+              <a:pPr/>
               <a:t>‹#›</a:t>
             </a:fld>
             <a:endParaRPr lang="en-US"/>
@@ -4307,7 +4338,8 @@
           <a:p>
             <a:fld id="{B0C38071-61E7-2B4E-B2A4-01D49E5FA634}" type="datetimeFigureOut">
               <a:rPr lang="en-US" smtClean="0"/>
-              <a:t>10/7/12</a:t>
+              <a:pPr/>
+              <a:t>10/11/12</a:t>
             </a:fld>
             <a:endParaRPr lang="en-US"/>
           </a:p>
@@ -4357,6 +4389,7 @@
           <a:p>
             <a:fld id="{690E99A7-3422-3F4E-AC0B-3875C0E10C8A}" type="slidenum">
               <a:rPr lang="en-US" smtClean="0"/>
+              <a:pPr/>
               <a:t>‹#›</a:t>
             </a:fld>
             <a:endParaRPr lang="en-US"/>
@@ -4405,7 +4438,8 @@
           <a:p>
             <a:fld id="{B0C38071-61E7-2B4E-B2A4-01D49E5FA634}" type="datetimeFigureOut">
               <a:rPr lang="en-US" smtClean="0"/>
-              <a:t>10/7/12</a:t>
+              <a:pPr/>
+              <a:t>10/11/12</a:t>
             </a:fld>
             <a:endParaRPr lang="en-US"/>
           </a:p>
@@ -4455,6 +4489,7 @@
           <a:p>
             <a:fld id="{690E99A7-3422-3F4E-AC0B-3875C0E10C8A}" type="slidenum">
               <a:rPr lang="en-US" smtClean="0"/>
+              <a:pPr/>
               <a:t>‹#›</a:t>
             </a:fld>
             <a:endParaRPr lang="en-US"/>
@@ -4663,7 +4698,8 @@
           <a:p>
             <a:fld id="{B0C38071-61E7-2B4E-B2A4-01D49E5FA634}" type="datetimeFigureOut">
               <a:rPr lang="en-US" smtClean="0"/>
-              <a:t>10/7/12</a:t>
+              <a:pPr/>
+              <a:t>10/11/12</a:t>
             </a:fld>
             <a:endParaRPr lang="en-US"/>
           </a:p>
@@ -4725,6 +4761,7 @@
           <a:p>
             <a:fld id="{690E99A7-3422-3F4E-AC0B-3875C0E10C8A}" type="slidenum">
               <a:rPr lang="en-US" smtClean="0"/>
+              <a:pPr/>
               <a:t>‹#›</a:t>
             </a:fld>
             <a:endParaRPr lang="en-US"/>
@@ -5260,6 +5297,886 @@
               <a:rPr lang="en-US" dirty="0" smtClean="0"/>
               <a:t> and Gareth Davies</a:t>
             </a:r>
+            <a:endParaRPr lang="en-US" dirty="0"/>
+          </a:p>
+        </p:txBody>
+      </p:sp>
+    </p:spTree>
+  </p:cSld>
+  <p:clrMapOvr>
+    <a:masterClrMapping/>
+  </p:clrMapOvr>
+</p:sld>
+</file>
+
+<file path=ppt/slides/slide10.xml><?xml version="1.0" encoding="utf-8"?>
+<p:sld xmlns:a="http://schemas.openxmlformats.org/drawingml/2006/main" xmlns:r="http://schemas.openxmlformats.org/officeDocument/2006/relationships" xmlns:mc="http://schemas.openxmlformats.org/markup-compatibility/2006" xmlns:mv="urn:schemas-microsoft-com:mac:vml" xmlns:p="http://schemas.openxmlformats.org/presentationml/2006/main" mc:Ignorable="mv" mc:PreserveAttributes="mv:*">
+  <p:cSld>
+    <p:spTree>
+      <p:nvGrpSpPr>
+        <p:cNvPr id="1" name=""/>
+        <p:cNvGrpSpPr/>
+        <p:nvPr/>
+      </p:nvGrpSpPr>
+      <p:grpSpPr>
+        <a:xfrm>
+          <a:off x="0" y="0"/>
+          <a:ext cx="0" cy="0"/>
+          <a:chOff x="0" y="0"/>
+          <a:chExt cx="0" cy="0"/>
+        </a:xfrm>
+      </p:grpSpPr>
+      <p:sp>
+        <p:nvSpPr>
+          <p:cNvPr id="2" name="Title 1"/>
+          <p:cNvSpPr>
+            <a:spLocks noGrp="1"/>
+          </p:cNvSpPr>
+          <p:nvPr>
+            <p:ph type="title"/>
+          </p:nvPr>
+        </p:nvSpPr>
+        <p:spPr/>
+        <p:txBody>
+          <a:bodyPr/>
+          <a:lstStyle/>
+          <a:p>
+            <a:r>
+              <a:rPr lang="en-US" sz="4400" dirty="0" smtClean="0">
+                <a:latin typeface="Eurostile (Headings)"/>
+                <a:cs typeface="Eurostile (Headings)"/>
+              </a:rPr>
+              <a:t>Otto with the Dagger in the </a:t>
+            </a:r>
+            <a:r>
+              <a:rPr lang="en-US" sz="4400" dirty="0" err="1" smtClean="0">
+                <a:latin typeface="Eurostile (Headings)"/>
+                <a:cs typeface="Eurostile (Headings)"/>
+              </a:rPr>
+              <a:t>ActionBarSherlock</a:t>
+            </a:r>
+            <a:r>
+              <a:rPr lang="en-US" sz="4400" dirty="0" smtClean="0">
+                <a:latin typeface="Eurostile (Headings)"/>
+                <a:cs typeface="Eurostile (Headings)"/>
+              </a:rPr>
+              <a:t> library</a:t>
+            </a:r>
+            <a:endParaRPr lang="en-US" sz="4400" dirty="0">
+              <a:latin typeface="Eurostile (Headings)"/>
+              <a:cs typeface="Eurostile (Headings)"/>
+            </a:endParaRPr>
+          </a:p>
+        </p:txBody>
+      </p:sp>
+      <p:sp>
+        <p:nvSpPr>
+          <p:cNvPr id="3" name="Content Placeholder 2"/>
+          <p:cNvSpPr>
+            <a:spLocks noGrp="1"/>
+          </p:cNvSpPr>
+          <p:nvPr>
+            <p:ph idx="1"/>
+          </p:nvPr>
+        </p:nvSpPr>
+        <p:spPr/>
+        <p:txBody>
+          <a:bodyPr/>
+          <a:lstStyle/>
+          <a:p>
+            <a:r>
+              <a:rPr lang="en-US" dirty="0" smtClean="0"/>
+              <a:t>These aren’t other testing tools, these are other popular (or soon to be popular) libraries that make coding better and testing easier.</a:t>
+            </a:r>
+          </a:p>
+          <a:p>
+            <a:pPr lvl="1"/>
+            <a:r>
+              <a:rPr lang="en-US" dirty="0" err="1" smtClean="0"/>
+              <a:t>RoboGuice</a:t>
+            </a:r>
+            <a:endParaRPr lang="en-US" dirty="0" smtClean="0"/>
+          </a:p>
+          <a:p>
+            <a:pPr lvl="1"/>
+            <a:r>
+              <a:rPr lang="en-US" dirty="0" smtClean="0"/>
+              <a:t>Dagger</a:t>
+            </a:r>
+          </a:p>
+          <a:p>
+            <a:pPr lvl="1"/>
+            <a:r>
+              <a:rPr lang="en-US" dirty="0" err="1" smtClean="0"/>
+              <a:t>ActionBarSherlock</a:t>
+            </a:r>
+            <a:endParaRPr lang="en-US" dirty="0" smtClean="0"/>
+          </a:p>
+          <a:p>
+            <a:r>
+              <a:rPr lang="en-US" dirty="0" smtClean="0"/>
+              <a:t>Past Experience </a:t>
+            </a:r>
+          </a:p>
+          <a:p>
+            <a:pPr lvl="1"/>
+            <a:r>
+              <a:rPr lang="en-US" dirty="0" smtClean="0"/>
+              <a:t>Don’t have Dagger or </a:t>
+            </a:r>
+            <a:r>
+              <a:rPr lang="en-US" dirty="0" err="1" smtClean="0"/>
+              <a:t>ActionBarSherlock</a:t>
+            </a:r>
+            <a:r>
+              <a:rPr lang="en-US" dirty="0" smtClean="0"/>
+              <a:t> because we targeted the app to a specific device.</a:t>
+            </a:r>
+          </a:p>
+          <a:p>
+            <a:endParaRPr lang="en-US" dirty="0"/>
+          </a:p>
+        </p:txBody>
+      </p:sp>
+    </p:spTree>
+  </p:cSld>
+  <p:clrMapOvr>
+    <a:masterClrMapping/>
+  </p:clrMapOvr>
+</p:sld>
+</file>
+
+<file path=ppt/slides/slide11.xml><?xml version="1.0" encoding="utf-8"?>
+<p:sld xmlns:a="http://schemas.openxmlformats.org/drawingml/2006/main" xmlns:r="http://schemas.openxmlformats.org/officeDocument/2006/relationships" xmlns:mc="http://schemas.openxmlformats.org/markup-compatibility/2006" xmlns:mv="urn:schemas-microsoft-com:mac:vml" xmlns:p="http://schemas.openxmlformats.org/presentationml/2006/main" mc:Ignorable="mv" mc:PreserveAttributes="mv:*">
+  <p:cSld>
+    <p:spTree>
+      <p:nvGrpSpPr>
+        <p:cNvPr id="1" name=""/>
+        <p:cNvGrpSpPr/>
+        <p:nvPr/>
+      </p:nvGrpSpPr>
+      <p:grpSpPr>
+        <a:xfrm>
+          <a:off x="0" y="0"/>
+          <a:ext cx="0" cy="0"/>
+          <a:chOff x="0" y="0"/>
+          <a:chExt cx="0" cy="0"/>
+        </a:xfrm>
+      </p:grpSpPr>
+      <p:sp>
+        <p:nvSpPr>
+          <p:cNvPr id="2" name="Title 1"/>
+          <p:cNvSpPr>
+            <a:spLocks noGrp="1"/>
+          </p:cNvSpPr>
+          <p:nvPr>
+            <p:ph type="title"/>
+          </p:nvPr>
+        </p:nvSpPr>
+        <p:spPr/>
+        <p:txBody>
+          <a:bodyPr/>
+          <a:lstStyle/>
+          <a:p>
+            <a:r>
+              <a:rPr lang="en-US" dirty="0" smtClean="0"/>
+              <a:t>Questions / Comments</a:t>
+            </a:r>
+            <a:endParaRPr lang="en-US" dirty="0"/>
+          </a:p>
+        </p:txBody>
+      </p:sp>
+      <p:sp>
+        <p:nvSpPr>
+          <p:cNvPr id="3" name="Content Placeholder 2"/>
+          <p:cNvSpPr>
+            <a:spLocks noGrp="1"/>
+          </p:cNvSpPr>
+          <p:nvPr>
+            <p:ph idx="1"/>
+          </p:nvPr>
+        </p:nvSpPr>
+        <p:spPr/>
+        <p:txBody>
+          <a:bodyPr/>
+          <a:lstStyle/>
+          <a:p>
+            <a:r>
+              <a:rPr lang="en-US" dirty="0" smtClean="0"/>
+              <a:t>Questions?</a:t>
+            </a:r>
+          </a:p>
+          <a:p>
+            <a:r>
+              <a:rPr lang="en-US" dirty="0" smtClean="0"/>
+              <a:t>Comments?</a:t>
+            </a:r>
+          </a:p>
+          <a:p>
+            <a:r>
+              <a:rPr lang="en-US" dirty="0" err="1" smtClean="0"/>
+              <a:t>Quemments</a:t>
+            </a:r>
+            <a:r>
+              <a:rPr lang="en-US" dirty="0" smtClean="0"/>
+              <a:t>?  (Questions that are comments)</a:t>
+            </a:r>
+            <a:endParaRPr lang="en-US" dirty="0"/>
+          </a:p>
+        </p:txBody>
+      </p:sp>
+    </p:spTree>
+  </p:cSld>
+  <p:clrMapOvr>
+    <a:masterClrMapping/>
+  </p:clrMapOvr>
+</p:sld>
+</file>
+
+<file path=ppt/slides/slide2.xml><?xml version="1.0" encoding="utf-8"?>
+<p:sld xmlns:a="http://schemas.openxmlformats.org/drawingml/2006/main" xmlns:r="http://schemas.openxmlformats.org/officeDocument/2006/relationships" xmlns:mc="http://schemas.openxmlformats.org/markup-compatibility/2006" xmlns:mv="urn:schemas-microsoft-com:mac:vml" xmlns:p="http://schemas.openxmlformats.org/presentationml/2006/main" mc:Ignorable="mv" mc:PreserveAttributes="mv:*">
+  <p:cSld>
+    <p:spTree>
+      <p:nvGrpSpPr>
+        <p:cNvPr id="1" name=""/>
+        <p:cNvGrpSpPr/>
+        <p:nvPr/>
+      </p:nvGrpSpPr>
+      <p:grpSpPr>
+        <a:xfrm>
+          <a:off x="0" y="0"/>
+          <a:ext cx="0" cy="0"/>
+          <a:chOff x="0" y="0"/>
+          <a:chExt cx="0" cy="0"/>
+        </a:xfrm>
+      </p:grpSpPr>
+      <p:sp>
+        <p:nvSpPr>
+          <p:cNvPr id="2" name="Title 1"/>
+          <p:cNvSpPr>
+            <a:spLocks noGrp="1"/>
+          </p:cNvSpPr>
+          <p:nvPr>
+            <p:ph type="title"/>
+          </p:nvPr>
+        </p:nvSpPr>
+        <p:spPr/>
+        <p:txBody>
+          <a:bodyPr/>
+          <a:lstStyle/>
+          <a:p>
+            <a:r>
+              <a:rPr lang="en-US" dirty="0" smtClean="0"/>
+              <a:t>Approaches</a:t>
+            </a:r>
+            <a:endParaRPr lang="en-US" dirty="0"/>
+          </a:p>
+        </p:txBody>
+      </p:sp>
+      <p:sp>
+        <p:nvSpPr>
+          <p:cNvPr id="3" name="Content Placeholder 2"/>
+          <p:cNvSpPr>
+            <a:spLocks noGrp="1"/>
+          </p:cNvSpPr>
+          <p:nvPr>
+            <p:ph idx="1"/>
+          </p:nvPr>
+        </p:nvSpPr>
+        <p:spPr/>
+        <p:txBody>
+          <a:bodyPr/>
+          <a:lstStyle/>
+          <a:p>
+            <a:r>
+              <a:rPr lang="en-US" dirty="0" smtClean="0"/>
+              <a:t>Android </a:t>
+            </a:r>
+            <a:r>
+              <a:rPr lang="en-US" dirty="0" err="1" smtClean="0"/>
+              <a:t>JUnit</a:t>
+            </a:r>
+            <a:r>
+              <a:rPr lang="en-US" dirty="0" smtClean="0"/>
+              <a:t> Tests</a:t>
+            </a:r>
+          </a:p>
+          <a:p>
+            <a:r>
+              <a:rPr lang="en-US" dirty="0" err="1" smtClean="0"/>
+              <a:t>Robotium</a:t>
+            </a:r>
+            <a:endParaRPr lang="en-US" dirty="0" smtClean="0"/>
+          </a:p>
+          <a:p>
+            <a:r>
+              <a:rPr lang="en-US" dirty="0" err="1" smtClean="0"/>
+              <a:t>Robelectric</a:t>
+            </a:r>
+            <a:endParaRPr lang="en-US" dirty="0" smtClean="0"/>
+          </a:p>
+          <a:p>
+            <a:endParaRPr lang="en-US" dirty="0" smtClean="0"/>
+          </a:p>
+        </p:txBody>
+      </p:sp>
+    </p:spTree>
+  </p:cSld>
+  <p:clrMapOvr>
+    <a:masterClrMapping/>
+  </p:clrMapOvr>
+</p:sld>
+</file>
+
+<file path=ppt/slides/slide3.xml><?xml version="1.0" encoding="utf-8"?>
+<p:sld xmlns:a="http://schemas.openxmlformats.org/drawingml/2006/main" xmlns:r="http://schemas.openxmlformats.org/officeDocument/2006/relationships" xmlns:mc="http://schemas.openxmlformats.org/markup-compatibility/2006" xmlns:mv="urn:schemas-microsoft-com:mac:vml" xmlns:p="http://schemas.openxmlformats.org/presentationml/2006/main" mc:Ignorable="mv" mc:PreserveAttributes="mv:*">
+  <p:cSld>
+    <p:spTree>
+      <p:nvGrpSpPr>
+        <p:cNvPr id="1" name=""/>
+        <p:cNvGrpSpPr/>
+        <p:nvPr/>
+      </p:nvGrpSpPr>
+      <p:grpSpPr>
+        <a:xfrm>
+          <a:off x="0" y="0"/>
+          <a:ext cx="0" cy="0"/>
+          <a:chOff x="0" y="0"/>
+          <a:chExt cx="0" cy="0"/>
+        </a:xfrm>
+      </p:grpSpPr>
+      <p:sp>
+        <p:nvSpPr>
+          <p:cNvPr id="2" name="Title 1"/>
+          <p:cNvSpPr>
+            <a:spLocks noGrp="1"/>
+          </p:cNvSpPr>
+          <p:nvPr>
+            <p:ph type="title"/>
+          </p:nvPr>
+        </p:nvSpPr>
+        <p:spPr/>
+        <p:txBody>
+          <a:bodyPr/>
+          <a:lstStyle/>
+          <a:p>
+            <a:r>
+              <a:rPr lang="en-US" sz="4000" dirty="0" smtClean="0"/>
+              <a:t>Android </a:t>
+            </a:r>
+            <a:r>
+              <a:rPr lang="en-US" sz="4000" dirty="0" err="1" smtClean="0"/>
+              <a:t>JUnit</a:t>
+            </a:r>
+            <a:r>
+              <a:rPr lang="en-US" sz="4000" dirty="0" smtClean="0"/>
+              <a:t> Tests </a:t>
+            </a:r>
+            <a:endParaRPr lang="en-US" sz="4000" dirty="0"/>
+          </a:p>
+        </p:txBody>
+      </p:sp>
+      <p:sp>
+        <p:nvSpPr>
+          <p:cNvPr id="3" name="Content Placeholder 2"/>
+          <p:cNvSpPr>
+            <a:spLocks noGrp="1"/>
+          </p:cNvSpPr>
+          <p:nvPr>
+            <p:ph idx="1"/>
+          </p:nvPr>
+        </p:nvSpPr>
+        <p:spPr/>
+        <p:txBody>
+          <a:bodyPr/>
+          <a:lstStyle/>
+          <a:p>
+            <a:r>
+              <a:rPr lang="en-US" dirty="0" smtClean="0"/>
+              <a:t>Why don’t we use Android </a:t>
+            </a:r>
+            <a:r>
+              <a:rPr lang="en-US" dirty="0" err="1" smtClean="0"/>
+              <a:t>JUnit</a:t>
+            </a:r>
+            <a:r>
+              <a:rPr lang="en-US" dirty="0" smtClean="0"/>
+              <a:t> tests</a:t>
+            </a:r>
+          </a:p>
+          <a:p>
+            <a:r>
+              <a:rPr lang="en-US" dirty="0" err="1" smtClean="0"/>
+              <a:t>Robotium</a:t>
+            </a:r>
+            <a:endParaRPr lang="en-US" dirty="0"/>
+          </a:p>
+        </p:txBody>
+      </p:sp>
+    </p:spTree>
+  </p:cSld>
+  <p:clrMapOvr>
+    <a:masterClrMapping/>
+  </p:clrMapOvr>
+</p:sld>
+</file>
+
+<file path=ppt/slides/slide4.xml><?xml version="1.0" encoding="utf-8"?>
+<p:sld xmlns:a="http://schemas.openxmlformats.org/drawingml/2006/main" xmlns:r="http://schemas.openxmlformats.org/officeDocument/2006/relationships" xmlns:mc="http://schemas.openxmlformats.org/markup-compatibility/2006" xmlns:mv="urn:schemas-microsoft-com:mac:vml" xmlns:p="http://schemas.openxmlformats.org/presentationml/2006/main" mc:Ignorable="mv" mc:PreserveAttributes="mv:*">
+  <p:cSld>
+    <p:spTree>
+      <p:nvGrpSpPr>
+        <p:cNvPr id="1" name=""/>
+        <p:cNvGrpSpPr/>
+        <p:nvPr/>
+      </p:nvGrpSpPr>
+      <p:grpSpPr>
+        <a:xfrm>
+          <a:off x="0" y="0"/>
+          <a:ext cx="0" cy="0"/>
+          <a:chOff x="0" y="0"/>
+          <a:chExt cx="0" cy="0"/>
+        </a:xfrm>
+      </p:grpSpPr>
+      <p:sp>
+        <p:nvSpPr>
+          <p:cNvPr id="2" name="Title 1"/>
+          <p:cNvSpPr>
+            <a:spLocks noGrp="1"/>
+          </p:cNvSpPr>
+          <p:nvPr>
+            <p:ph type="title"/>
+          </p:nvPr>
+        </p:nvSpPr>
+        <p:spPr/>
+        <p:txBody>
+          <a:bodyPr/>
+          <a:lstStyle/>
+          <a:p>
+            <a:r>
+              <a:rPr lang="en-US" dirty="0" smtClean="0"/>
+              <a:t>Our Approach</a:t>
+            </a:r>
+            <a:endParaRPr lang="en-US" dirty="0"/>
+          </a:p>
+        </p:txBody>
+      </p:sp>
+      <p:sp>
+        <p:nvSpPr>
+          <p:cNvPr id="3" name="Content Placeholder 2"/>
+          <p:cNvSpPr>
+            <a:spLocks noGrp="1"/>
+          </p:cNvSpPr>
+          <p:nvPr>
+            <p:ph idx="1"/>
+          </p:nvPr>
+        </p:nvSpPr>
+        <p:spPr/>
+        <p:txBody>
+          <a:bodyPr/>
+          <a:lstStyle/>
+          <a:p>
+            <a:r>
+              <a:rPr lang="en-US" dirty="0" smtClean="0"/>
+              <a:t>Why did we choose </a:t>
+            </a:r>
+            <a:r>
+              <a:rPr lang="en-US" dirty="0" err="1" smtClean="0"/>
+              <a:t>Robelectric</a:t>
+            </a:r>
+            <a:r>
+              <a:rPr lang="en-US" dirty="0" smtClean="0"/>
+              <a:t>?</a:t>
+            </a:r>
+          </a:p>
+          <a:p>
+            <a:r>
+              <a:rPr lang="en-US" dirty="0" smtClean="0"/>
+              <a:t>Quick high level about the demo app.</a:t>
+            </a:r>
+            <a:endParaRPr lang="en-US" dirty="0"/>
+          </a:p>
+        </p:txBody>
+      </p:sp>
+    </p:spTree>
+  </p:cSld>
+  <p:clrMapOvr>
+    <a:masterClrMapping/>
+  </p:clrMapOvr>
+</p:sld>
+</file>
+
+<file path=ppt/slides/slide5.xml><?xml version="1.0" encoding="utf-8"?>
+<p:sld xmlns:a="http://schemas.openxmlformats.org/drawingml/2006/main" xmlns:r="http://schemas.openxmlformats.org/officeDocument/2006/relationships" xmlns:mc="http://schemas.openxmlformats.org/markup-compatibility/2006" xmlns:mv="urn:schemas-microsoft-com:mac:vml" xmlns:p="http://schemas.openxmlformats.org/presentationml/2006/main" mc:Ignorable="mv" mc:PreserveAttributes="mv:*">
+  <p:cSld>
+    <p:spTree>
+      <p:nvGrpSpPr>
+        <p:cNvPr id="1" name=""/>
+        <p:cNvGrpSpPr/>
+        <p:nvPr/>
+      </p:nvGrpSpPr>
+      <p:grpSpPr>
+        <a:xfrm>
+          <a:off x="0" y="0"/>
+          <a:ext cx="0" cy="0"/>
+          <a:chOff x="0" y="0"/>
+          <a:chExt cx="0" cy="0"/>
+        </a:xfrm>
+      </p:grpSpPr>
+      <p:sp>
+        <p:nvSpPr>
+          <p:cNvPr id="2" name="Title 1"/>
+          <p:cNvSpPr>
+            <a:spLocks noGrp="1"/>
+          </p:cNvSpPr>
+          <p:nvPr>
+            <p:ph type="title"/>
+          </p:nvPr>
+        </p:nvSpPr>
+        <p:spPr/>
+        <p:txBody>
+          <a:bodyPr/>
+          <a:lstStyle/>
+          <a:p>
+            <a:r>
+              <a:rPr lang="en-US" dirty="0" err="1" smtClean="0"/>
+              <a:t>Robolectric</a:t>
+            </a:r>
+            <a:endParaRPr lang="en-US" dirty="0"/>
+          </a:p>
+        </p:txBody>
+      </p:sp>
+      <p:sp>
+        <p:nvSpPr>
+          <p:cNvPr id="3" name="Content Placeholder 2"/>
+          <p:cNvSpPr>
+            <a:spLocks noGrp="1"/>
+          </p:cNvSpPr>
+          <p:nvPr>
+            <p:ph idx="1"/>
+          </p:nvPr>
+        </p:nvSpPr>
+        <p:spPr/>
+        <p:txBody>
+          <a:bodyPr/>
+          <a:lstStyle/>
+          <a:p>
+            <a:r>
+              <a:rPr lang="en-US" dirty="0" smtClean="0"/>
+              <a:t>What are the main concepts?</a:t>
+            </a:r>
+            <a:endParaRPr lang="en-US" dirty="0"/>
+          </a:p>
+        </p:txBody>
+      </p:sp>
+    </p:spTree>
+  </p:cSld>
+  <p:clrMapOvr>
+    <a:masterClrMapping/>
+  </p:clrMapOvr>
+</p:sld>
+</file>
+
+<file path=ppt/slides/slide6.xml><?xml version="1.0" encoding="utf-8"?>
+<p:sld xmlns:a="http://schemas.openxmlformats.org/drawingml/2006/main" xmlns:r="http://schemas.openxmlformats.org/officeDocument/2006/relationships" xmlns:mc="http://schemas.openxmlformats.org/markup-compatibility/2006" xmlns:mv="urn:schemas-microsoft-com:mac:vml" xmlns:p="http://schemas.openxmlformats.org/presentationml/2006/main" mc:Ignorable="mv" mc:PreserveAttributes="mv:*">
+  <p:cSld>
+    <p:spTree>
+      <p:nvGrpSpPr>
+        <p:cNvPr id="1" name=""/>
+        <p:cNvGrpSpPr/>
+        <p:nvPr/>
+      </p:nvGrpSpPr>
+      <p:grpSpPr>
+        <a:xfrm>
+          <a:off x="0" y="0"/>
+          <a:ext cx="0" cy="0"/>
+          <a:chOff x="0" y="0"/>
+          <a:chExt cx="0" cy="0"/>
+        </a:xfrm>
+      </p:grpSpPr>
+      <p:sp>
+        <p:nvSpPr>
+          <p:cNvPr id="2" name="Title 1"/>
+          <p:cNvSpPr>
+            <a:spLocks noGrp="1"/>
+          </p:cNvSpPr>
+          <p:nvPr>
+            <p:ph type="title"/>
+          </p:nvPr>
+        </p:nvSpPr>
+        <p:spPr/>
+        <p:txBody>
+          <a:bodyPr/>
+          <a:lstStyle/>
+          <a:p>
+            <a:r>
+              <a:rPr lang="en-US" dirty="0" smtClean="0"/>
+              <a:t>Application Structure</a:t>
+            </a:r>
+            <a:endParaRPr lang="en-US" dirty="0"/>
+          </a:p>
+        </p:txBody>
+      </p:sp>
+      <p:sp>
+        <p:nvSpPr>
+          <p:cNvPr id="3" name="Content Placeholder 2"/>
+          <p:cNvSpPr>
+            <a:spLocks noGrp="1"/>
+          </p:cNvSpPr>
+          <p:nvPr>
+            <p:ph idx="1"/>
+          </p:nvPr>
+        </p:nvSpPr>
+        <p:spPr/>
+        <p:txBody>
+          <a:bodyPr/>
+          <a:lstStyle/>
+          <a:p>
+            <a:r>
+              <a:rPr lang="en-US" dirty="0" smtClean="0"/>
+              <a:t>High level </a:t>
+            </a:r>
+          </a:p>
+          <a:p>
+            <a:r>
+              <a:rPr lang="en-US" dirty="0" smtClean="0"/>
+              <a:t>Registry based Application</a:t>
+            </a:r>
+            <a:endParaRPr lang="en-US" dirty="0"/>
+          </a:p>
+        </p:txBody>
+      </p:sp>
+    </p:spTree>
+  </p:cSld>
+  <p:clrMapOvr>
+    <a:masterClrMapping/>
+  </p:clrMapOvr>
+</p:sld>
+</file>
+
+<file path=ppt/slides/slide7.xml><?xml version="1.0" encoding="utf-8"?>
+<p:sld xmlns:a="http://schemas.openxmlformats.org/drawingml/2006/main" xmlns:r="http://schemas.openxmlformats.org/officeDocument/2006/relationships" xmlns:mc="http://schemas.openxmlformats.org/markup-compatibility/2006" xmlns:mv="urn:schemas-microsoft-com:mac:vml" xmlns:p="http://schemas.openxmlformats.org/presentationml/2006/main" mc:Ignorable="mv" mc:PreserveAttributes="mv:*">
+  <p:cSld>
+    <p:spTree>
+      <p:nvGrpSpPr>
+        <p:cNvPr id="1" name=""/>
+        <p:cNvGrpSpPr/>
+        <p:nvPr/>
+      </p:nvGrpSpPr>
+      <p:grpSpPr>
+        <a:xfrm>
+          <a:off x="0" y="0"/>
+          <a:ext cx="0" cy="0"/>
+          <a:chOff x="0" y="0"/>
+          <a:chExt cx="0" cy="0"/>
+        </a:xfrm>
+      </p:grpSpPr>
+      <p:sp>
+        <p:nvSpPr>
+          <p:cNvPr id="2" name="Title 1"/>
+          <p:cNvSpPr>
+            <a:spLocks noGrp="1"/>
+          </p:cNvSpPr>
+          <p:nvPr>
+            <p:ph type="title"/>
+          </p:nvPr>
+        </p:nvSpPr>
+        <p:spPr/>
+        <p:txBody>
+          <a:bodyPr/>
+          <a:lstStyle/>
+          <a:p>
+            <a:r>
+              <a:rPr lang="en-US" dirty="0" smtClean="0"/>
+              <a:t>Demo</a:t>
+            </a:r>
+            <a:endParaRPr lang="en-US" dirty="0"/>
+          </a:p>
+        </p:txBody>
+      </p:sp>
+      <p:sp>
+        <p:nvSpPr>
+          <p:cNvPr id="3" name="Content Placeholder 2"/>
+          <p:cNvSpPr>
+            <a:spLocks noGrp="1"/>
+          </p:cNvSpPr>
+          <p:nvPr>
+            <p:ph idx="1"/>
+          </p:nvPr>
+        </p:nvSpPr>
+        <p:spPr/>
+        <p:txBody>
+          <a:bodyPr/>
+          <a:lstStyle/>
+          <a:p>
+            <a:r>
+              <a:rPr lang="en-US" dirty="0" smtClean="0"/>
+              <a:t>Simple straightforward case demo where we don’t have a custom shadow</a:t>
+            </a:r>
+            <a:endParaRPr lang="en-US" dirty="0"/>
+          </a:p>
+        </p:txBody>
+      </p:sp>
+    </p:spTree>
+  </p:cSld>
+  <p:clrMapOvr>
+    <a:masterClrMapping/>
+  </p:clrMapOvr>
+</p:sld>
+</file>
+
+<file path=ppt/slides/slide8.xml><?xml version="1.0" encoding="utf-8"?>
+<p:sld xmlns:a="http://schemas.openxmlformats.org/drawingml/2006/main" xmlns:r="http://schemas.openxmlformats.org/officeDocument/2006/relationships" xmlns:mc="http://schemas.openxmlformats.org/markup-compatibility/2006" xmlns:mv="urn:schemas-microsoft-com:mac:vml" xmlns:p="http://schemas.openxmlformats.org/presentationml/2006/main" mc:Ignorable="mv" mc:PreserveAttributes="mv:*">
+  <p:cSld>
+    <p:spTree>
+      <p:nvGrpSpPr>
+        <p:cNvPr id="1" name=""/>
+        <p:cNvGrpSpPr/>
+        <p:nvPr/>
+      </p:nvGrpSpPr>
+      <p:grpSpPr>
+        <a:xfrm>
+          <a:off x="0" y="0"/>
+          <a:ext cx="0" cy="0"/>
+          <a:chOff x="0" y="0"/>
+          <a:chExt cx="0" cy="0"/>
+        </a:xfrm>
+      </p:grpSpPr>
+      <p:sp>
+        <p:nvSpPr>
+          <p:cNvPr id="2" name="Title 1"/>
+          <p:cNvSpPr>
+            <a:spLocks noGrp="1"/>
+          </p:cNvSpPr>
+          <p:nvPr>
+            <p:ph type="title"/>
+          </p:nvPr>
+        </p:nvSpPr>
+        <p:spPr/>
+        <p:txBody>
+          <a:bodyPr/>
+          <a:lstStyle/>
+          <a:p>
+            <a:r>
+              <a:rPr lang="en-US" dirty="0" smtClean="0"/>
+              <a:t>Shadow Classes</a:t>
+            </a:r>
+            <a:endParaRPr lang="en-US" dirty="0"/>
+          </a:p>
+        </p:txBody>
+      </p:sp>
+      <p:sp>
+        <p:nvSpPr>
+          <p:cNvPr id="3" name="Content Placeholder 2"/>
+          <p:cNvSpPr>
+            <a:spLocks noGrp="1"/>
+          </p:cNvSpPr>
+          <p:nvPr>
+            <p:ph idx="1"/>
+          </p:nvPr>
+        </p:nvSpPr>
+        <p:spPr/>
+        <p:txBody>
+          <a:bodyPr/>
+          <a:lstStyle/>
+          <a:p>
+            <a:r>
+              <a:rPr lang="en-US" dirty="0" smtClean="0"/>
+              <a:t>What is a shadow class?</a:t>
+            </a:r>
+          </a:p>
+          <a:p>
+            <a:r>
+              <a:rPr lang="en-US" dirty="0" smtClean="0"/>
+              <a:t>Why would you write a custom shadow class</a:t>
+            </a:r>
+            <a:r>
+              <a:rPr lang="en-US" dirty="0" smtClean="0"/>
+              <a:t>?</a:t>
+            </a:r>
+          </a:p>
+          <a:p>
+            <a:r>
+              <a:rPr lang="en-US" dirty="0" err="1" smtClean="0"/>
+              <a:t>Robolectric</a:t>
+            </a:r>
+            <a:r>
+              <a:rPr lang="en-US" smtClean="0"/>
+              <a:t> TestRunner</a:t>
+            </a:r>
+            <a:endParaRPr lang="en-US" dirty="0" smtClean="0"/>
+          </a:p>
+          <a:p>
+            <a:pPr>
+              <a:buNone/>
+            </a:pPr>
+            <a:endParaRPr lang="en-US" dirty="0"/>
+          </a:p>
+        </p:txBody>
+      </p:sp>
+    </p:spTree>
+  </p:cSld>
+  <p:clrMapOvr>
+    <a:masterClrMapping/>
+  </p:clrMapOvr>
+</p:sld>
+</file>
+
+<file path=ppt/slides/slide9.xml><?xml version="1.0" encoding="utf-8"?>
+<p:sld xmlns:a="http://schemas.openxmlformats.org/drawingml/2006/main" xmlns:r="http://schemas.openxmlformats.org/officeDocument/2006/relationships" xmlns:mc="http://schemas.openxmlformats.org/markup-compatibility/2006" xmlns:mv="urn:schemas-microsoft-com:mac:vml" xmlns:p="http://schemas.openxmlformats.org/presentationml/2006/main" mc:Ignorable="mv" mc:PreserveAttributes="mv:*">
+  <p:cSld>
+    <p:spTree>
+      <p:nvGrpSpPr>
+        <p:cNvPr id="1" name=""/>
+        <p:cNvGrpSpPr/>
+        <p:nvPr/>
+      </p:nvGrpSpPr>
+      <p:grpSpPr>
+        <a:xfrm>
+          <a:off x="0" y="0"/>
+          <a:ext cx="0" cy="0"/>
+          <a:chOff x="0" y="0"/>
+          <a:chExt cx="0" cy="0"/>
+        </a:xfrm>
+      </p:grpSpPr>
+      <p:sp>
+        <p:nvSpPr>
+          <p:cNvPr id="2" name="Title 1"/>
+          <p:cNvSpPr>
+            <a:spLocks noGrp="1"/>
+          </p:cNvSpPr>
+          <p:nvPr>
+            <p:ph type="title"/>
+          </p:nvPr>
+        </p:nvSpPr>
+        <p:spPr/>
+        <p:txBody>
+          <a:bodyPr/>
+          <a:lstStyle/>
+          <a:p>
+            <a:r>
+              <a:rPr lang="en-US" dirty="0" smtClean="0"/>
+              <a:t>Shadow Class Demo</a:t>
+            </a:r>
+            <a:endParaRPr lang="en-US" dirty="0"/>
+          </a:p>
+        </p:txBody>
+      </p:sp>
+      <p:sp>
+        <p:nvSpPr>
+          <p:cNvPr id="3" name="Content Placeholder 2"/>
+          <p:cNvSpPr>
+            <a:spLocks noGrp="1"/>
+          </p:cNvSpPr>
+          <p:nvPr>
+            <p:ph idx="1"/>
+          </p:nvPr>
+        </p:nvSpPr>
+        <p:spPr/>
+        <p:txBody>
+          <a:bodyPr/>
+          <a:lstStyle/>
+          <a:p>
             <a:endParaRPr lang="en-US" dirty="0"/>
           </a:p>
         </p:txBody>

</xml_diff>

<commit_message>
Committing changes to the PowerPoint
</commit_message>
<xml_diff>
--- a/thomas-android/src/main/presentations/Unit Testing.pptx
+++ b/thomas-android/src/main/presentations/Unit Testing.pptx
@@ -207,7 +207,7 @@
             <a:fld id="{DA076EBB-1C5E-334A-B4F8-1D7B3B403335}" type="datetimeFigureOut">
               <a:rPr lang="en-US" smtClean="0"/>
               <a:pPr/>
-              <a:t>10/16/12</a:t>
+              <a:t>11/6/12</a:t>
             </a:fld>
             <a:endParaRPr lang="en-US"/>
           </a:p>
@@ -369,7 +369,7 @@
             <a:fld id="{A2404591-B34B-CF4C-BA40-6A959E540D05}" type="datetimeFigureOut">
               <a:rPr lang="en-US" smtClean="0"/>
               <a:pPr/>
-              <a:t>10/16/12</a:t>
+              <a:t>11/6/12</a:t>
             </a:fld>
             <a:endParaRPr lang="en-US"/>
           </a:p>
@@ -1243,7 +1243,7 @@
             <a:fld id="{0106B4A3-4212-4E39-93DE-E053E8F69C28}" type="datetimeFigureOut">
               <a:rPr lang="en-US" smtClean="0"/>
               <a:pPr/>
-              <a:t>10/16/12</a:t>
+              <a:t>11/6/12</a:t>
             </a:fld>
             <a:endParaRPr lang="en-US"/>
           </a:p>
@@ -1552,7 +1552,7 @@
             <a:fld id="{B0C38071-61E7-2B4E-B2A4-01D49E5FA634}" type="datetimeFigureOut">
               <a:rPr lang="en-US" smtClean="0"/>
               <a:pPr/>
-              <a:t>10/16/12</a:t>
+              <a:t>11/6/12</a:t>
             </a:fld>
             <a:endParaRPr lang="en-US"/>
           </a:p>
@@ -1843,7 +1843,7 @@
             <a:fld id="{B0C38071-61E7-2B4E-B2A4-01D49E5FA634}" type="datetimeFigureOut">
               <a:rPr lang="en-US" smtClean="0"/>
               <a:pPr/>
-              <a:t>10/16/12</a:t>
+              <a:t>11/6/12</a:t>
             </a:fld>
             <a:endParaRPr lang="en-US"/>
           </a:p>
@@ -2022,7 +2022,7 @@
             <a:fld id="{B0C38071-61E7-2B4E-B2A4-01D49E5FA634}" type="datetimeFigureOut">
               <a:rPr lang="en-US" smtClean="0"/>
               <a:pPr/>
-              <a:t>10/16/12</a:t>
+              <a:t>11/6/12</a:t>
             </a:fld>
             <a:endParaRPr lang="en-US"/>
           </a:p>
@@ -2207,7 +2207,7 @@
             <a:fld id="{B0C38071-61E7-2B4E-B2A4-01D49E5FA634}" type="datetimeFigureOut">
               <a:rPr lang="en-US" smtClean="0"/>
               <a:pPr/>
-              <a:t>10/16/12</a:t>
+              <a:t>11/6/12</a:t>
             </a:fld>
             <a:endParaRPr lang="en-US"/>
           </a:p>
@@ -2418,7 +2418,7 @@
             <a:fld id="{B0C38071-61E7-2B4E-B2A4-01D49E5FA634}" type="datetimeFigureOut">
               <a:rPr lang="en-US" smtClean="0"/>
               <a:pPr/>
-              <a:t>10/16/12</a:t>
+              <a:t>11/6/12</a:t>
             </a:fld>
             <a:endParaRPr lang="en-US"/>
           </a:p>
@@ -2759,7 +2759,7 @@
             <a:fld id="{B0C38071-61E7-2B4E-B2A4-01D49E5FA634}" type="datetimeFigureOut">
               <a:rPr lang="en-US" smtClean="0"/>
               <a:pPr/>
-              <a:t>10/16/12</a:t>
+              <a:t>11/6/12</a:t>
             </a:fld>
             <a:endParaRPr lang="en-US"/>
           </a:p>
@@ -3151,7 +3151,7 @@
             <a:fld id="{B0C38071-61E7-2B4E-B2A4-01D49E5FA634}" type="datetimeFigureOut">
               <a:rPr lang="en-US" smtClean="0"/>
               <a:pPr/>
-              <a:t>10/16/12</a:t>
+              <a:t>11/6/12</a:t>
             </a:fld>
             <a:endParaRPr lang="en-US"/>
           </a:p>
@@ -3527,7 +3527,7 @@
             <a:fld id="{74CBEAF9-9E58-4CC8-A6FF-6DD8A58DEEA4}" type="datetimeFigureOut">
               <a:rPr lang="en-US" smtClean="0"/>
               <a:pPr/>
-              <a:t>10/16/12</a:t>
+              <a:t>11/6/12</a:t>
             </a:fld>
             <a:endParaRPr lang="en-US"/>
           </a:p>
@@ -3835,7 +3835,7 @@
             <a:fld id="{B0C38071-61E7-2B4E-B2A4-01D49E5FA634}" type="datetimeFigureOut">
               <a:rPr lang="en-US" smtClean="0"/>
               <a:pPr/>
-              <a:t>10/16/12</a:t>
+              <a:t>11/6/12</a:t>
             </a:fld>
             <a:endParaRPr lang="en-US"/>
           </a:p>
@@ -4508,7 +4508,7 @@
             <a:fld id="{B0C38071-61E7-2B4E-B2A4-01D49E5FA634}" type="datetimeFigureOut">
               <a:rPr lang="en-US" smtClean="0"/>
               <a:pPr/>
-              <a:t>10/16/12</a:t>
+              <a:t>11/6/12</a:t>
             </a:fld>
             <a:endParaRPr lang="en-US"/>
           </a:p>
@@ -4631,7 +4631,7 @@
             <a:fld id="{B0C38071-61E7-2B4E-B2A4-01D49E5FA634}" type="datetimeFigureOut">
               <a:rPr lang="en-US" smtClean="0"/>
               <a:pPr/>
-              <a:t>10/16/12</a:t>
+              <a:t>11/6/12</a:t>
             </a:fld>
             <a:endParaRPr lang="en-US"/>
           </a:p>
@@ -4731,7 +4731,7 @@
             <a:fld id="{B0C38071-61E7-2B4E-B2A4-01D49E5FA634}" type="datetimeFigureOut">
               <a:rPr lang="en-US" smtClean="0"/>
               <a:pPr/>
-              <a:t>10/16/12</a:t>
+              <a:t>11/6/12</a:t>
             </a:fld>
             <a:endParaRPr lang="en-US"/>
           </a:p>
@@ -4991,7 +4991,7 @@
             <a:fld id="{B0C38071-61E7-2B4E-B2A4-01D49E5FA634}" type="datetimeFigureOut">
               <a:rPr lang="en-US" smtClean="0"/>
               <a:pPr/>
-              <a:t>10/16/12</a:t>
+              <a:t>11/6/12</a:t>
             </a:fld>
             <a:endParaRPr lang="en-US"/>
           </a:p>
@@ -5817,11 +5817,7 @@
             </a:r>
             <a:r>
               <a:rPr lang="en-US" dirty="0" smtClean="0"/>
-              <a:t> </a:t>
-            </a:r>
-            <a:r>
-              <a:rPr lang="en-US" dirty="0" smtClean="0"/>
-              <a:t>is incomplete.  </a:t>
+              <a:t> is incomplete.  </a:t>
             </a:r>
           </a:p>
           <a:p>
@@ -5845,11 +5841,7 @@
             </a:r>
             <a:r>
               <a:rPr lang="en-US" dirty="0" smtClean="0"/>
-              <a:t> if you absolutely need </a:t>
-            </a:r>
-            <a:r>
-              <a:rPr lang="en-US" dirty="0" smtClean="0"/>
-              <a:t>it</a:t>
+              <a:t> if you absolutely need it</a:t>
             </a:r>
           </a:p>
           <a:p>
@@ -5928,19 +5920,12 @@
           <a:p>
             <a:r>
               <a:rPr lang="en-US" dirty="0" smtClean="0"/>
-              <a:t>Comments?</a:t>
-            </a:r>
-          </a:p>
-          <a:p>
-            <a:r>
-              <a:rPr lang="en-US" dirty="0" err="1" smtClean="0"/>
-              <a:t>Quemments</a:t>
+              <a:t>Comments</a:t>
             </a:r>
             <a:r>
               <a:rPr lang="en-US" dirty="0" smtClean="0"/>
-              <a:t>?  (Questions that are comments)</a:t>
-            </a:r>
-            <a:endParaRPr lang="en-US" dirty="0"/>
+              <a:t>?</a:t>
+            </a:r>
           </a:p>
         </p:txBody>
       </p:sp>
@@ -6081,11 +6066,7 @@
           <a:p>
             <a:r>
               <a:rPr lang="en-US" sz="4000" dirty="0" smtClean="0"/>
-              <a:t>Rejected</a:t>
-            </a:r>
-            <a:r>
-              <a:rPr lang="en-US" sz="4000" dirty="0" smtClean="0"/>
-              <a:t> Approaches</a:t>
+              <a:t>Rejected Approaches</a:t>
             </a:r>
             <a:endParaRPr lang="en-US" sz="4000" dirty="0"/>
           </a:p>
@@ -6118,11 +6099,7 @@
             </a:r>
             <a:r>
               <a:rPr lang="en-US" dirty="0" smtClean="0"/>
-              <a:t> </a:t>
-            </a:r>
-            <a:r>
-              <a:rPr lang="en-US" dirty="0" smtClean="0"/>
-              <a:t>tests or </a:t>
+              <a:t> tests or </a:t>
             </a:r>
             <a:r>
               <a:rPr lang="en-US" dirty="0" err="1" smtClean="0"/>
@@ -6145,7 +6122,6 @@
               <a:rPr lang="en-US" dirty="0" smtClean="0"/>
               <a:t>“Stub!”</a:t>
             </a:r>
-            <a:endParaRPr lang="en-US" dirty="0" smtClean="0"/>
           </a:p>
           <a:p>
             <a:pPr lvl="2"/>
@@ -6164,23 +6140,7 @@
           <a:p>
             <a:r>
               <a:rPr lang="en-US" dirty="0" smtClean="0"/>
-              <a:t>Require separate </a:t>
-            </a:r>
-            <a:r>
-              <a:rPr lang="en-US" dirty="0" smtClean="0"/>
-              <a:t>t</a:t>
-            </a:r>
-            <a:r>
-              <a:rPr lang="en-US" dirty="0" smtClean="0"/>
-              <a:t>est </a:t>
-            </a:r>
-            <a:r>
-              <a:rPr lang="en-US" dirty="0" smtClean="0"/>
-              <a:t>p</a:t>
-            </a:r>
-            <a:r>
-              <a:rPr lang="en-US" dirty="0" smtClean="0"/>
-              <a:t>roject</a:t>
+              <a:t>Require separate test project</a:t>
             </a:r>
           </a:p>
           <a:p>
@@ -6234,11 +6194,7 @@
           <a:p>
             <a:r>
               <a:rPr lang="en-US" dirty="0" smtClean="0"/>
-              <a:t>Our </a:t>
-            </a:r>
-            <a:r>
-              <a:rPr lang="en-US" dirty="0" smtClean="0"/>
-              <a:t>Approach</a:t>
+              <a:t>Our Approach</a:t>
             </a:r>
             <a:endParaRPr lang="en-US" dirty="0"/>
           </a:p>
@@ -6300,16 +6256,11 @@
               <a:rPr lang="en-US" dirty="0" smtClean="0"/>
               <a:t>Tests in same project as source code</a:t>
             </a:r>
-            <a:endParaRPr lang="en-US" dirty="0" smtClean="0"/>
           </a:p>
           <a:p>
             <a:r>
               <a:rPr lang="en-US" dirty="0" smtClean="0"/>
-              <a:t>Quick high level about the demo app</a:t>
-            </a:r>
-            <a:r>
-              <a:rPr lang="en-US" dirty="0" smtClean="0"/>
-              <a:t>.</a:t>
+              <a:t>Quick high level about the demo app.</a:t>
             </a:r>
           </a:p>
           <a:p>
@@ -6403,11 +6354,7 @@
           <a:p>
             <a:r>
               <a:rPr lang="en-US" dirty="0" smtClean="0"/>
-              <a:t>What are the main concepts</a:t>
-            </a:r>
-            <a:r>
-              <a:rPr lang="en-US" dirty="0" smtClean="0"/>
-              <a:t>?</a:t>
+              <a:t>What are the main concepts?</a:t>
             </a:r>
           </a:p>
           <a:p>

</xml_diff>

<commit_message>
Updates based on first dry run at TPS.
</commit_message>
<xml_diff>
--- a/thomas-android/src/main/presentations/Unit Testing.pptx
+++ b/thomas-android/src/main/presentations/Unit Testing.pptx
@@ -5,10 +5,10 @@
     <p:sldMasterId id="2147484550" r:id="rId1"/>
   </p:sldMasterIdLst>
   <p:notesMasterIdLst>
-    <p:notesMasterId r:id="rId16"/>
+    <p:notesMasterId r:id="rId17"/>
   </p:notesMasterIdLst>
   <p:handoutMasterIdLst>
-    <p:handoutMasterId r:id="rId17"/>
+    <p:handoutMasterId r:id="rId18"/>
   </p:handoutMasterIdLst>
   <p:sldIdLst>
     <p:sldId id="256" r:id="rId2"/>
@@ -25,6 +25,7 @@
     <p:sldId id="260" r:id="rId13"/>
     <p:sldId id="267" r:id="rId14"/>
     <p:sldId id="262" r:id="rId15"/>
+    <p:sldId id="270" r:id="rId16"/>
   </p:sldIdLst>
   <p:sldSz cx="9144000" cy="6858000" type="screen4x3"/>
   <p:notesSz cx="6858000" cy="9144000"/>
@@ -209,7 +210,7 @@
             <a:fld id="{DA076EBB-1C5E-334A-B4F8-1D7B3B403335}" type="datetimeFigureOut">
               <a:rPr lang="en-US" smtClean="0"/>
               <a:pPr/>
-              <a:t>11/17/2012</a:t>
+              <a:t>11/27/2012</a:t>
             </a:fld>
             <a:endParaRPr lang="en-US"/>
           </a:p>
@@ -371,7 +372,7 @@
             <a:fld id="{A2404591-B34B-CF4C-BA40-6A959E540D05}" type="datetimeFigureOut">
               <a:rPr lang="en-US" smtClean="0"/>
               <a:pPr/>
-              <a:t>11/17/2012</a:t>
+              <a:t>11/27/2012</a:t>
             </a:fld>
             <a:endParaRPr lang="en-US"/>
           </a:p>
@@ -687,6 +688,23 @@
               <a:rPr lang="en-US" dirty="0" smtClean="0"/>
               <a:t>BRYCE</a:t>
             </a:r>
+          </a:p>
+          <a:p>
+            <a:endParaRPr lang="en-US" dirty="0" smtClean="0"/>
+          </a:p>
+          <a:p>
+            <a:r>
+              <a:rPr lang="en-US" dirty="0" smtClean="0"/>
+              <a:t> - Ask audience for Android</a:t>
+            </a:r>
+            <a:r>
+              <a:rPr lang="en-US" baseline="0" dirty="0" smtClean="0"/>
+              <a:t> experience (show of hands on who has done more than write </a:t>
+            </a:r>
+            <a:r>
+              <a:rPr lang="en-US" baseline="0" smtClean="0"/>
+              <a:t>Hello World code).</a:t>
+            </a:r>
             <a:endParaRPr lang="en-US" dirty="0"/>
           </a:p>
         </p:txBody>
@@ -771,7 +789,7 @@
           <a:p>
             <a:r>
               <a:rPr lang="en-US" dirty="0" smtClean="0"/>
-              <a:t>BRYCE</a:t>
+              <a:t>GARETH</a:t>
             </a:r>
           </a:p>
           <a:p>
@@ -779,20 +797,24 @@
           </a:p>
           <a:p>
             <a:r>
-              <a:rPr lang="en-US" dirty="0" smtClean="0"/>
-              <a:t>TODO: Refer</a:t>
-            </a:r>
-            <a:r>
               <a:rPr lang="en-US" baseline="0" dirty="0" smtClean="0"/>
-              <a:t> to </a:t>
+              <a:t>Sometimes you can add/extend shadows in your own project but that doesn’t always work (e.g. </a:t>
             </a:r>
             <a:r>
               <a:rPr lang="en-US" baseline="0" dirty="0" err="1" smtClean="0"/>
-              <a:t>Robolectric</a:t>
+              <a:t>ListFragment</a:t>
             </a:r>
             <a:r>
               <a:rPr lang="en-US" baseline="0" dirty="0" smtClean="0"/>
-              <a:t> User Guide’s definition of shadow.</a:t>
+              <a:t>, </a:t>
+            </a:r>
+            <a:r>
+              <a:rPr lang="en-US" baseline="0" dirty="0" err="1" smtClean="0"/>
+              <a:t>Fragment.getSupportLoaderManager</a:t>
+            </a:r>
+            <a:r>
+              <a:rPr lang="en-US" baseline="0" dirty="0" smtClean="0"/>
+              <a:t>()).</a:t>
             </a:r>
             <a:endParaRPr lang="en-US" dirty="0"/>
           </a:p>
@@ -890,6 +912,23 @@
             <a:endParaRPr lang="en-US" dirty="0" smtClean="0"/>
           </a:p>
           <a:p>
+            <a:pPr marL="0" marR="0" indent="0" algn="l" defTabSz="457200" rtl="0" eaLnBrk="1" fontAlgn="auto" latinLnBrk="0" hangingPunct="1">
+              <a:lnSpc>
+                <a:spcPct val="100000"/>
+              </a:lnSpc>
+              <a:spcBef>
+                <a:spcPts val="0"/>
+              </a:spcBef>
+              <a:spcAft>
+                <a:spcPts val="0"/>
+              </a:spcAft>
+              <a:buClrTx/>
+              <a:buSzTx/>
+              <a:buFontTx/>
+              <a:buNone/>
+              <a:tabLst/>
+              <a:defRPr/>
+            </a:pPr>
             <a:r>
               <a:rPr lang="en-US" dirty="0" smtClean="0"/>
               <a:t>Custom Shadow: </a:t>
@@ -898,6 +937,30 @@
               <a:rPr lang="en-US" dirty="0" err="1" smtClean="0"/>
               <a:t>TrainingSessionLoaderTest</a:t>
             </a:r>
+            <a:r>
+              <a:rPr lang="en-US" dirty="0" smtClean="0"/>
+              <a:t>. </a:t>
+            </a:r>
+            <a:r>
+              <a:rPr lang="en-US" dirty="0" err="1" smtClean="0"/>
+              <a:t>deliverResultsKeepsLastResultsFromService</a:t>
+            </a:r>
+            <a:r>
+              <a:rPr lang="en-US" dirty="0" smtClean="0"/>
+              <a:t>: </a:t>
+            </a:r>
+            <a:r>
+              <a:rPr lang="en-US" dirty="0" err="1" smtClean="0"/>
+              <a:t>Robolectric.shadowOf</a:t>
+            </a:r>
+            <a:r>
+              <a:rPr lang="en-US" dirty="0" smtClean="0"/>
+              <a:t>_, </a:t>
+            </a:r>
+            <a:r>
+              <a:rPr lang="en-US" dirty="0" err="1" smtClean="0"/>
+              <a:t>ShadowLoader</a:t>
+            </a:r>
             <a:endParaRPr lang="en-US" dirty="0" smtClean="0"/>
           </a:p>
           <a:p>
@@ -911,6 +974,14 @@
             <a:r>
               <a:rPr lang="en-US" dirty="0" err="1" smtClean="0"/>
               <a:t>RetrieveAvailableTrainingSessionsServiceTest</a:t>
+            </a:r>
+            <a:r>
+              <a:rPr lang="en-US" dirty="0" smtClean="0"/>
+              <a:t>: </a:t>
+            </a:r>
+            <a:r>
+              <a:rPr lang="en-US" dirty="0" err="1" smtClean="0"/>
+              <a:t>Robolectric.setDefaultHttpResponse</a:t>
             </a:r>
             <a:endParaRPr lang="en-US" dirty="0"/>
           </a:p>
@@ -1265,6 +1336,88 @@
 </p:notes>
 </file>
 
+<file path=ppt/notesSlides/notesSlide15.xml><?xml version="1.0" encoding="utf-8"?>
+<p:notes xmlns:a="http://schemas.openxmlformats.org/drawingml/2006/main" xmlns:r="http://schemas.openxmlformats.org/officeDocument/2006/relationships" xmlns:p="http://schemas.openxmlformats.org/presentationml/2006/main">
+  <p:cSld>
+    <p:spTree>
+      <p:nvGrpSpPr>
+        <p:cNvPr id="1" name=""/>
+        <p:cNvGrpSpPr/>
+        <p:nvPr/>
+      </p:nvGrpSpPr>
+      <p:grpSpPr>
+        <a:xfrm>
+          <a:off x="0" y="0"/>
+          <a:ext cx="0" cy="0"/>
+          <a:chOff x="0" y="0"/>
+          <a:chExt cx="0" cy="0"/>
+        </a:xfrm>
+      </p:grpSpPr>
+      <p:sp>
+        <p:nvSpPr>
+          <p:cNvPr id="2" name="Slide Image Placeholder 1"/>
+          <p:cNvSpPr>
+            <a:spLocks noGrp="1" noRot="1" noChangeAspect="1"/>
+          </p:cNvSpPr>
+          <p:nvPr>
+            <p:ph type="sldImg"/>
+          </p:nvPr>
+        </p:nvSpPr>
+        <p:spPr/>
+      </p:sp>
+      <p:sp>
+        <p:nvSpPr>
+          <p:cNvPr id="3" name="Notes Placeholder 2"/>
+          <p:cNvSpPr>
+            <a:spLocks noGrp="1"/>
+          </p:cNvSpPr>
+          <p:nvPr>
+            <p:ph type="body" idx="1"/>
+          </p:nvPr>
+        </p:nvSpPr>
+        <p:spPr/>
+        <p:txBody>
+          <a:bodyPr>
+            <a:normAutofit/>
+          </a:bodyPr>
+          <a:lstStyle/>
+          <a:p>
+            <a:endParaRPr lang="en-US"/>
+          </a:p>
+        </p:txBody>
+      </p:sp>
+      <p:sp>
+        <p:nvSpPr>
+          <p:cNvPr id="4" name="Slide Number Placeholder 3"/>
+          <p:cNvSpPr>
+            <a:spLocks noGrp="1"/>
+          </p:cNvSpPr>
+          <p:nvPr>
+            <p:ph type="sldNum" sz="quarter" idx="10"/>
+          </p:nvPr>
+        </p:nvSpPr>
+        <p:spPr/>
+        <p:txBody>
+          <a:bodyPr/>
+          <a:lstStyle/>
+          <a:p>
+            <a:fld id="{35D29BC8-E804-EA44-A2C1-31832AE6737B}" type="slidenum">
+              <a:rPr lang="en-US" smtClean="0"/>
+              <a:pPr/>
+              <a:t>15</a:t>
+            </a:fld>
+            <a:endParaRPr lang="en-US"/>
+          </a:p>
+        </p:txBody>
+      </p:sp>
+    </p:spTree>
+  </p:cSld>
+  <p:clrMapOvr>
+    <a:masterClrMapping/>
+  </p:clrMapOvr>
+</p:notes>
+</file>
+
 <file path=ppt/notesSlides/notesSlide2.xml><?xml version="1.0" encoding="utf-8"?>
 <p:notes xmlns:a="http://schemas.openxmlformats.org/drawingml/2006/main" xmlns:r="http://schemas.openxmlformats.org/officeDocument/2006/relationships" xmlns:p="http://schemas.openxmlformats.org/presentationml/2006/main">
   <p:cSld>
@@ -1426,28 +1579,6 @@
               <a:rPr lang="en-US" baseline="0" dirty="0" smtClean="0"/>
               <a:t>Implementation in the Android.jar is completely stubbed out.   If you try to run the Android.jar against your unit tests, it’ll just throw exceptions and shout “Stub!” at you.</a:t>
             </a:r>
-            <a:endParaRPr lang="en-US" dirty="0" smtClean="0"/>
-          </a:p>
-          <a:p>
-            <a:endParaRPr lang="en-US" dirty="0" smtClean="0"/>
-          </a:p>
-          <a:p>
-            <a:r>
-              <a:rPr lang="en-US" dirty="0" smtClean="0"/>
-              <a:t>TODO: Verify </a:t>
-            </a:r>
-            <a:r>
-              <a:rPr lang="en-US" baseline="0" dirty="0" smtClean="0"/>
-              <a:t>still based on </a:t>
-            </a:r>
-            <a:r>
-              <a:rPr lang="en-US" baseline="0" dirty="0" err="1" smtClean="0"/>
-              <a:t>JUnit</a:t>
-            </a:r>
-            <a:r>
-              <a:rPr lang="en-US" baseline="0" dirty="0" smtClean="0"/>
-              <a:t> 3.</a:t>
-            </a:r>
           </a:p>
         </p:txBody>
       </p:sp>
@@ -1802,7 +1933,15 @@
             </a:r>
             <a:r>
               <a:rPr lang="en-US" baseline="0" dirty="0" smtClean="0"/>
-              <a:t> silently replaces android.jar stub implementations with its own “shadow” implementations. @</a:t>
+              <a:t> </a:t>
+            </a:r>
+            <a:r>
+              <a:rPr lang="en-US" baseline="0" dirty="0" smtClean="0"/>
+              <a:t>silently replaces </a:t>
+            </a:r>
+            <a:r>
+              <a:rPr lang="en-US" baseline="0" dirty="0" smtClean="0"/>
+              <a:t>android.jar stub implementations with its own “shadow” implementations. @</a:t>
             </a:r>
             <a:r>
               <a:rPr lang="en-US" baseline="0" dirty="0" err="1" smtClean="0"/>
@@ -1827,23 +1966,7 @@
           <a:p>
             <a:r>
               <a:rPr lang="en-US" baseline="0" dirty="0" smtClean="0"/>
-              <a:t>Doesn’t work in absolutely every case. Shadows either do not exist for every Android class or are incomplete. Sometimes you can add/extend shadows in your own project but that doesn’t always work (e.g. </a:t>
-            </a:r>
-            <a:r>
-              <a:rPr lang="en-US" baseline="0" dirty="0" err="1" smtClean="0"/>
-              <a:t>ListFragment</a:t>
-            </a:r>
-            <a:r>
-              <a:rPr lang="en-US" baseline="0" dirty="0" smtClean="0"/>
-              <a:t>, </a:t>
-            </a:r>
-            <a:r>
-              <a:rPr lang="en-US" baseline="0" dirty="0" err="1" smtClean="0"/>
-              <a:t>Fragment.getSupportLoaderManager</a:t>
-            </a:r>
-            <a:r>
-              <a:rPr lang="en-US" baseline="0" dirty="0" smtClean="0"/>
-              <a:t>()).</a:t>
+              <a:t>Doesn’t work in absolutely every case. Shadows either do not exist for every Android class or are incomplete. </a:t>
             </a:r>
           </a:p>
           <a:p>
@@ -2051,7 +2174,125 @@
               <a:rPr lang="en-US" dirty="0" err="1" smtClean="0"/>
               <a:t>TrainingSessionDetailActivityTest</a:t>
             </a:r>
-            <a:endParaRPr lang="en-US" dirty="0"/>
+            <a:endParaRPr lang="en-US" dirty="0" smtClean="0"/>
+          </a:p>
+          <a:p>
+            <a:r>
+              <a:rPr lang="en-US" dirty="0" smtClean="0"/>
+              <a:t>  - </a:t>
+            </a:r>
+            <a:r>
+              <a:rPr lang="en-US" dirty="0" err="1" smtClean="0"/>
+              <a:t>ThomasTestRunner</a:t>
+            </a:r>
+            <a:endParaRPr lang="en-US" dirty="0" smtClean="0"/>
+          </a:p>
+          <a:p>
+            <a:r>
+              <a:rPr lang="en-US" dirty="0" smtClean="0"/>
+              <a:t>  - Depending</a:t>
+            </a:r>
+            <a:r>
+              <a:rPr lang="en-US" baseline="0" dirty="0" smtClean="0"/>
+              <a:t> on audience, briefly define Intent and Fragment.</a:t>
+            </a:r>
+          </a:p>
+          <a:p>
+            <a:r>
+              <a:rPr lang="en-US" baseline="0" dirty="0" smtClean="0"/>
+              <a:t>  - </a:t>
+            </a:r>
+            <a:r>
+              <a:rPr lang="en-US" sz="1200" kern="1200" dirty="0" err="1" smtClean="0">
+                <a:solidFill>
+                  <a:schemeClr val="tx1"/>
+                </a:solidFill>
+                <a:latin typeface="+mn-lt"/>
+                <a:ea typeface="+mn-ea"/>
+                <a:cs typeface="+mn-cs"/>
+              </a:rPr>
+              <a:t>shouldAddFragmentBasedOnIntentWhenCreating</a:t>
+            </a:r>
+            <a:r>
+              <a:rPr lang="en-US" sz="1200" kern="1200" dirty="0" smtClean="0">
+                <a:solidFill>
+                  <a:schemeClr val="tx1"/>
+                </a:solidFill>
+                <a:latin typeface="+mn-lt"/>
+                <a:ea typeface="+mn-ea"/>
+                <a:cs typeface="+mn-cs"/>
+              </a:rPr>
+              <a:t>: no explicit </a:t>
+            </a:r>
+            <a:r>
+              <a:rPr lang="en-US" sz="1200" kern="1200" dirty="0" err="1" smtClean="0">
+                <a:solidFill>
+                  <a:schemeClr val="tx1"/>
+                </a:solidFill>
+                <a:latin typeface="+mn-lt"/>
+                <a:ea typeface="+mn-ea"/>
+                <a:cs typeface="+mn-cs"/>
+              </a:rPr>
+              <a:t>Robolectric</a:t>
+            </a:r>
+            <a:r>
+              <a:rPr lang="en-US" sz="1200" kern="1200" dirty="0" smtClean="0">
+                <a:solidFill>
+                  <a:schemeClr val="tx1"/>
+                </a:solidFill>
+                <a:latin typeface="+mn-lt"/>
+                <a:ea typeface="+mn-ea"/>
+                <a:cs typeface="+mn-cs"/>
+              </a:rPr>
+              <a:t> use</a:t>
+            </a:r>
+          </a:p>
+          <a:p>
+            <a:r>
+              <a:rPr lang="en-US" sz="1200" kern="1200" dirty="0" smtClean="0">
+                <a:solidFill>
+                  <a:schemeClr val="tx1"/>
+                </a:solidFill>
+                <a:latin typeface="+mn-lt"/>
+                <a:ea typeface="+mn-ea"/>
+                <a:cs typeface="+mn-cs"/>
+              </a:rPr>
+              <a:t>  - shouldStartParentActivityAndCloseThisOneWhenHomeMenuItemSelected: </a:t>
+            </a:r>
+            <a:r>
+              <a:rPr lang="en-US" sz="1200" i="0" kern="1200" dirty="0" err="1" smtClean="0">
+                <a:solidFill>
+                  <a:schemeClr val="tx1"/>
+                </a:solidFill>
+                <a:latin typeface="+mn-lt"/>
+                <a:ea typeface="+mn-ea"/>
+                <a:cs typeface="+mn-cs"/>
+              </a:rPr>
+              <a:t>Robolectric.shadowOf</a:t>
+            </a:r>
+            <a:r>
+              <a:rPr lang="en-US" sz="1200" i="0" kern="1200" dirty="0" smtClean="0">
+                <a:solidFill>
+                  <a:schemeClr val="tx1"/>
+                </a:solidFill>
+                <a:latin typeface="+mn-lt"/>
+                <a:ea typeface="+mn-ea"/>
+                <a:cs typeface="+mn-cs"/>
+              </a:rPr>
+              <a:t>, </a:t>
+            </a:r>
+            <a:r>
+              <a:rPr lang="en-US" sz="1200" i="0" kern="1200" dirty="0" err="1" smtClean="0">
+                <a:solidFill>
+                  <a:schemeClr val="tx1"/>
+                </a:solidFill>
+                <a:latin typeface="+mn-lt"/>
+                <a:ea typeface="+mn-ea"/>
+                <a:cs typeface="+mn-cs"/>
+              </a:rPr>
+              <a:t>ShadowActivity.getNextStartedActivity</a:t>
+            </a:r>
+            <a:endParaRPr lang="en-US" i="0" dirty="0"/>
           </a:p>
         </p:txBody>
       </p:sp>
@@ -2263,7 +2504,7 @@
             <a:fld id="{0106B4A3-4212-4E39-93DE-E053E8F69C28}" type="datetimeFigureOut">
               <a:rPr lang="en-US" smtClean="0"/>
               <a:pPr/>
-              <a:t>11/17/2012</a:t>
+              <a:t>11/27/2012</a:t>
             </a:fld>
             <a:endParaRPr lang="en-US"/>
           </a:p>
@@ -2440,7 +2681,7 @@
             <a:fld id="{B0C38071-61E7-2B4E-B2A4-01D49E5FA634}" type="datetimeFigureOut">
               <a:rPr lang="en-US" smtClean="0"/>
               <a:pPr/>
-              <a:t>11/17/2012</a:t>
+              <a:t>11/27/2012</a:t>
             </a:fld>
             <a:endParaRPr lang="en-US"/>
           </a:p>
@@ -2617,7 +2858,7 @@
             <a:fld id="{B0C38071-61E7-2B4E-B2A4-01D49E5FA634}" type="datetimeFigureOut">
               <a:rPr lang="en-US" smtClean="0"/>
               <a:pPr/>
-              <a:t>11/17/2012</a:t>
+              <a:t>11/27/2012</a:t>
             </a:fld>
             <a:endParaRPr lang="en-US"/>
           </a:p>
@@ -2784,7 +3025,7 @@
             <a:fld id="{B0C38071-61E7-2B4E-B2A4-01D49E5FA634}" type="datetimeFigureOut">
               <a:rPr lang="en-US" smtClean="0"/>
               <a:pPr/>
-              <a:t>11/17/2012</a:t>
+              <a:t>11/27/2012</a:t>
             </a:fld>
             <a:endParaRPr lang="en-US"/>
           </a:p>
@@ -3020,7 +3261,7 @@
             <a:fld id="{74CBEAF9-9E58-4CC8-A6FF-6DD8A58DEEA4}" type="datetimeFigureOut">
               <a:rPr lang="en-US" smtClean="0"/>
               <a:pPr/>
-              <a:t>11/17/2012</a:t>
+              <a:t>11/27/2012</a:t>
             </a:fld>
             <a:endParaRPr lang="en-US"/>
           </a:p>
@@ -3318,7 +3559,7 @@
             <a:fld id="{B0C38071-61E7-2B4E-B2A4-01D49E5FA634}" type="datetimeFigureOut">
               <a:rPr lang="en-US" smtClean="0"/>
               <a:pPr/>
-              <a:t>11/17/2012</a:t>
+              <a:t>11/27/2012</a:t>
             </a:fld>
             <a:endParaRPr lang="en-US"/>
           </a:p>
@@ -3704,7 +3945,7 @@
             <a:fld id="{B0C38071-61E7-2B4E-B2A4-01D49E5FA634}" type="datetimeFigureOut">
               <a:rPr lang="en-US" smtClean="0"/>
               <a:pPr/>
-              <a:t>11/17/2012</a:t>
+              <a:t>11/27/2012</a:t>
             </a:fld>
             <a:endParaRPr lang="en-US"/>
           </a:p>
@@ -3879,7 +4120,7 @@
             <a:fld id="{B0C38071-61E7-2B4E-B2A4-01D49E5FA634}" type="datetimeFigureOut">
               <a:rPr lang="en-US" smtClean="0"/>
               <a:pPr/>
-              <a:t>11/17/2012</a:t>
+              <a:t>11/27/2012</a:t>
             </a:fld>
             <a:endParaRPr lang="en-US"/>
           </a:p>
@@ -3971,7 +4212,7 @@
             <a:fld id="{B0C38071-61E7-2B4E-B2A4-01D49E5FA634}" type="datetimeFigureOut">
               <a:rPr lang="en-US" smtClean="0"/>
               <a:pPr/>
-              <a:t>11/17/2012</a:t>
+              <a:t>11/27/2012</a:t>
             </a:fld>
             <a:endParaRPr lang="en-US"/>
           </a:p>
@@ -4268,7 +4509,7 @@
             <a:fld id="{B0C38071-61E7-2B4E-B2A4-01D49E5FA634}" type="datetimeFigureOut">
               <a:rPr lang="en-US" smtClean="0"/>
               <a:pPr/>
-              <a:t>11/17/2012</a:t>
+              <a:t>11/27/2012</a:t>
             </a:fld>
             <a:endParaRPr lang="en-US"/>
           </a:p>
@@ -4404,7 +4645,7 @@
             <a:fld id="{B0C38071-61E7-2B4E-B2A4-01D49E5FA634}" type="datetimeFigureOut">
               <a:rPr lang="en-US" smtClean="0"/>
               <a:pPr/>
-              <a:t>11/17/2012</a:t>
+              <a:t>11/27/2012</a:t>
             </a:fld>
             <a:endParaRPr lang="en-US"/>
           </a:p>
@@ -4709,7 +4950,7 @@
             <a:fld id="{B0C38071-61E7-2B4E-B2A4-01D49E5FA634}" type="datetimeFigureOut">
               <a:rPr lang="en-US" smtClean="0"/>
               <a:pPr/>
-              <a:t>11/17/2012</a:t>
+              <a:t>11/27/2012</a:t>
             </a:fld>
             <a:endParaRPr lang="en-US"/>
           </a:p>
@@ -5642,8 +5883,17 @@
           <a:p>
             <a:r>
               <a:rPr lang="en-US" dirty="0" smtClean="0"/>
-              <a:t>Past Experience </a:t>
-            </a:r>
+              <a:t>Libraries we have used in production code that is unit-tested with </a:t>
+            </a:r>
+            <a:r>
+              <a:rPr lang="en-US" dirty="0" err="1" smtClean="0"/>
+              <a:t>Robolectric</a:t>
+            </a:r>
+            <a:r>
+              <a:rPr lang="en-US" dirty="0" smtClean="0"/>
+              <a:t>.</a:t>
+            </a:r>
+            <a:endParaRPr lang="en-US" dirty="0" smtClean="0"/>
           </a:p>
           <a:p>
             <a:pPr lvl="1"/>
@@ -5679,8 +5929,9 @@
           <a:p>
             <a:r>
               <a:rPr lang="en-US" dirty="0" smtClean="0"/>
-              <a:t>Consider other libraries that improve production code and (generally) make testing easier.</a:t>
-            </a:r>
+              <a:t>Libraries we are exploring in newer code.</a:t>
+            </a:r>
+            <a:endParaRPr lang="en-US" dirty="0" smtClean="0"/>
           </a:p>
           <a:p>
             <a:pPr lvl="1"/>
@@ -5769,8 +6020,8 @@
           <a:lstStyle/>
           <a:p>
             <a:r>
-              <a:rPr lang="en-US" dirty="0" smtClean="0"/>
-              <a:t>Resource</a:t>
+              <a:rPr lang="en-US" dirty="0" err="1" smtClean="0"/>
+              <a:t>ResourceS</a:t>
             </a:r>
             <a:endParaRPr lang="en-US" dirty="0"/>
           </a:p>
@@ -5955,6 +6206,189 @@
 </p:sld>
 </file>
 
+<file path=ppt/slides/slide15.xml><?xml version="1.0" encoding="utf-8"?>
+<p:sld xmlns:a="http://schemas.openxmlformats.org/drawingml/2006/main" xmlns:r="http://schemas.openxmlformats.org/officeDocument/2006/relationships" xmlns:p="http://schemas.openxmlformats.org/presentationml/2006/main">
+  <p:cSld>
+    <p:spTree>
+      <p:nvGrpSpPr>
+        <p:cNvPr id="1" name=""/>
+        <p:cNvGrpSpPr/>
+        <p:nvPr/>
+      </p:nvGrpSpPr>
+      <p:grpSpPr>
+        <a:xfrm>
+          <a:off x="0" y="0"/>
+          <a:ext cx="0" cy="0"/>
+          <a:chOff x="0" y="0"/>
+          <a:chExt cx="0" cy="0"/>
+        </a:xfrm>
+      </p:grpSpPr>
+      <p:sp>
+        <p:nvSpPr>
+          <p:cNvPr id="2" name="Title 1"/>
+          <p:cNvSpPr>
+            <a:spLocks noGrp="1"/>
+          </p:cNvSpPr>
+          <p:nvPr>
+            <p:ph type="title"/>
+          </p:nvPr>
+        </p:nvSpPr>
+        <p:spPr/>
+        <p:txBody>
+          <a:bodyPr/>
+          <a:lstStyle/>
+          <a:p>
+            <a:r>
+              <a:rPr lang="en-US" dirty="0" smtClean="0"/>
+              <a:t>BIOS</a:t>
+            </a:r>
+            <a:endParaRPr lang="en-US" dirty="0"/>
+          </a:p>
+        </p:txBody>
+      </p:sp>
+      <p:sp>
+        <p:nvSpPr>
+          <p:cNvPr id="3" name="Content Placeholder 2"/>
+          <p:cNvSpPr>
+            <a:spLocks noGrp="1"/>
+          </p:cNvSpPr>
+          <p:nvPr>
+            <p:ph idx="1"/>
+          </p:nvPr>
+        </p:nvSpPr>
+        <p:spPr/>
+        <p:txBody>
+          <a:bodyPr>
+            <a:normAutofit fontScale="85000" lnSpcReduction="10000"/>
+          </a:bodyPr>
+          <a:lstStyle/>
+          <a:p>
+            <a:r>
+              <a:rPr lang="en-US" dirty="0" smtClean="0"/>
+              <a:t>Bryce </a:t>
+            </a:r>
+            <a:r>
+              <a:rPr lang="en-US" dirty="0" err="1" smtClean="0"/>
+              <a:t>Penberthy</a:t>
+            </a:r>
+            <a:r>
+              <a:rPr lang="en-US" dirty="0" smtClean="0"/>
+              <a:t> (@</a:t>
+            </a:r>
+            <a:r>
+              <a:rPr lang="en-US" dirty="0" err="1" smtClean="0"/>
+              <a:t>brycep</a:t>
+            </a:r>
+            <a:r>
+              <a:rPr lang="en-US" dirty="0" smtClean="0"/>
+              <a:t>)</a:t>
+            </a:r>
+          </a:p>
+          <a:p>
+            <a:pPr lvl="1"/>
+            <a:r>
+              <a:rPr lang="en-US" dirty="0" smtClean="0"/>
+              <a:t>Work at Daugherty Business Solutions</a:t>
+            </a:r>
+          </a:p>
+          <a:p>
+            <a:pPr lvl="1"/>
+            <a:r>
+              <a:rPr lang="en-US" dirty="0" smtClean="0"/>
+              <a:t>4 years of </a:t>
+            </a:r>
+            <a:r>
+              <a:rPr lang="en-US" dirty="0" err="1" smtClean="0"/>
+              <a:t>iOS</a:t>
+            </a:r>
+            <a:r>
+              <a:rPr lang="en-US" dirty="0" smtClean="0"/>
+              <a:t> experience, 1 year of Android</a:t>
+            </a:r>
+          </a:p>
+          <a:p>
+            <a:pPr lvl="1"/>
+            <a:r>
+              <a:rPr lang="en-US" dirty="0" smtClean="0"/>
+              <a:t>1 app in App Store (</a:t>
+            </a:r>
+            <a:r>
+              <a:rPr lang="en-US" dirty="0" err="1" smtClean="0"/>
+              <a:t>Wrenchy</a:t>
+            </a:r>
+            <a:r>
+              <a:rPr lang="en-US" dirty="0" smtClean="0"/>
+              <a:t>)</a:t>
+            </a:r>
+          </a:p>
+          <a:p>
+            <a:pPr lvl="1"/>
+            <a:r>
+              <a:rPr lang="en-US" dirty="0" smtClean="0"/>
+              <a:t>1 internal enterprise Android app in production (Monsanto)</a:t>
+            </a:r>
+          </a:p>
+          <a:p>
+            <a:r>
+              <a:rPr lang="en-US" dirty="0" smtClean="0"/>
+              <a:t>Gareth Davies (@</a:t>
+            </a:r>
+            <a:r>
+              <a:rPr lang="en-US" dirty="0" err="1" smtClean="0"/>
+              <a:t>wombleabroad</a:t>
+            </a:r>
+            <a:r>
+              <a:rPr lang="en-US" dirty="0" smtClean="0"/>
+              <a:t>)</a:t>
+            </a:r>
+          </a:p>
+          <a:p>
+            <a:pPr lvl="1"/>
+            <a:r>
+              <a:rPr lang="en-US" dirty="0" smtClean="0"/>
+              <a:t>Work at Daugherty Business Solutions</a:t>
+            </a:r>
+          </a:p>
+          <a:p>
+            <a:pPr lvl="1"/>
+            <a:r>
+              <a:rPr lang="en-US" dirty="0" smtClean="0"/>
+              <a:t>3 years of Android experience</a:t>
+            </a:r>
+          </a:p>
+          <a:p>
+            <a:pPr lvl="1"/>
+            <a:r>
+              <a:rPr lang="en-US" dirty="0" smtClean="0"/>
+              <a:t>1 app in Google Play (</a:t>
+            </a:r>
+            <a:r>
+              <a:rPr lang="en-US" dirty="0" err="1" smtClean="0"/>
+              <a:t>Farpost</a:t>
+            </a:r>
+            <a:r>
+              <a:rPr lang="en-US" dirty="0" smtClean="0"/>
+              <a:t>)</a:t>
+            </a:r>
+          </a:p>
+          <a:p>
+            <a:pPr lvl="1"/>
+            <a:r>
+              <a:rPr lang="en-US" dirty="0" smtClean="0"/>
+              <a:t>1 internal enterprise Android app in production (Monsanto)</a:t>
+            </a:r>
+            <a:endParaRPr lang="en-US" dirty="0"/>
+          </a:p>
+        </p:txBody>
+      </p:sp>
+    </p:spTree>
+  </p:cSld>
+  <p:clrMapOvr>
+    <a:masterClrMapping/>
+  </p:clrMapOvr>
+</p:sld>
+</file>
+
 <file path=ppt/slides/slide2.xml><?xml version="1.0" encoding="utf-8"?>
 <p:sld xmlns:a="http://schemas.openxmlformats.org/drawingml/2006/main" xmlns:r="http://schemas.openxmlformats.org/officeDocument/2006/relationships" xmlns:p="http://schemas.openxmlformats.org/presentationml/2006/main">
   <p:cSld>
@@ -6039,7 +6473,7 @@
           <a:p>
             <a:r>
               <a:rPr lang="en-US" dirty="0" err="1" smtClean="0"/>
-              <a:t>Robelectric</a:t>
+              <a:t>Robolectric</a:t>
             </a:r>
             <a:endParaRPr lang="en-US" dirty="0" smtClean="0"/>
           </a:p>
@@ -6130,7 +6564,41 @@
           <a:p>
             <a:r>
               <a:rPr lang="en-US" dirty="0" smtClean="0"/>
-              <a:t>Android </a:t>
+              <a:t>Requires Emulator or Device</a:t>
+            </a:r>
+          </a:p>
+          <a:p>
+            <a:pPr lvl="1"/>
+            <a:r>
+              <a:rPr lang="en-US" dirty="0" smtClean="0"/>
+              <a:t>“Stub!”</a:t>
+            </a:r>
+          </a:p>
+          <a:p>
+            <a:pPr lvl="1"/>
+            <a:r>
+              <a:rPr lang="en-US" dirty="0" smtClean="0"/>
+              <a:t>Slower</a:t>
+            </a:r>
+          </a:p>
+          <a:p>
+            <a:pPr lvl="1"/>
+            <a:r>
+              <a:rPr lang="en-US" dirty="0" smtClean="0"/>
+              <a:t>Difficult to configure on build server</a:t>
+            </a:r>
+          </a:p>
+          <a:p>
+            <a:r>
+              <a:rPr lang="en-US" dirty="0" smtClean="0"/>
+              <a:t>Not easy to use</a:t>
+            </a:r>
+          </a:p>
+          <a:p>
+            <a:pPr lvl="1"/>
+            <a:r>
+              <a:rPr lang="en-US" dirty="0" smtClean="0"/>
+              <a:t>Must extend base classes that are </a:t>
             </a:r>
             <a:r>
               <a:rPr lang="en-US" dirty="0" err="1" smtClean="0"/>
@@ -6138,63 +6606,6 @@
             </a:r>
             <a:r>
               <a:rPr lang="en-US" dirty="0" smtClean="0"/>
-              <a:t> Tests</a:t>
-            </a:r>
-          </a:p>
-          <a:p>
-            <a:pPr lvl="1"/>
-            <a:r>
-              <a:rPr lang="en-US" dirty="0" smtClean="0"/>
-              <a:t>Requires Emulator</a:t>
-            </a:r>
-          </a:p>
-          <a:p>
-            <a:pPr lvl="2"/>
-            <a:r>
-              <a:rPr lang="en-US" sz="2000" dirty="0" smtClean="0"/>
-              <a:t>Slower</a:t>
-            </a:r>
-          </a:p>
-          <a:p>
-            <a:pPr lvl="2"/>
-            <a:r>
-              <a:rPr lang="en-US" sz="2000" dirty="0" smtClean="0"/>
-              <a:t>Difficult to configure on build server</a:t>
-            </a:r>
-          </a:p>
-          <a:p>
-            <a:pPr lvl="1"/>
-            <a:r>
-              <a:rPr lang="en-US" dirty="0" smtClean="0"/>
-              <a:t>Requires separate test project</a:t>
-            </a:r>
-          </a:p>
-          <a:p>
-            <a:pPr lvl="2"/>
-            <a:r>
-              <a:rPr lang="en-US" sz="2000" dirty="0" smtClean="0"/>
-              <a:t>“Stub!”</a:t>
-            </a:r>
-          </a:p>
-          <a:p>
-            <a:pPr lvl="1"/>
-            <a:r>
-              <a:rPr lang="en-US" dirty="0" smtClean="0"/>
-              <a:t>Not easy to use</a:t>
-            </a:r>
-          </a:p>
-          <a:p>
-            <a:pPr lvl="2"/>
-            <a:r>
-              <a:rPr lang="en-US" sz="2000" dirty="0" smtClean="0"/>
-              <a:t>Must extend base classes that are </a:t>
-            </a:r>
-            <a:r>
-              <a:rPr lang="en-US" sz="2000" dirty="0" err="1" smtClean="0"/>
-              <a:t>JUnit</a:t>
-            </a:r>
-            <a:r>
-              <a:rPr lang="en-US" sz="2000" dirty="0" smtClean="0"/>
               <a:t> 3 subclasses</a:t>
             </a:r>
           </a:p>
@@ -6280,14 +6691,13 @@
           <a:p>
             <a:r>
               <a:rPr lang="en-US" dirty="0" smtClean="0"/>
-              <a:t>Requires Emulator</a:t>
-            </a:r>
-          </a:p>
-          <a:p>
-            <a:r>
-              <a:rPr lang="en-US" dirty="0" smtClean="0"/>
-              <a:t>Requires separate test project</a:t>
-            </a:r>
+              <a:t>Requires </a:t>
+            </a:r>
+            <a:r>
+              <a:rPr lang="en-US" dirty="0" smtClean="0"/>
+              <a:t>Emulator or Device</a:t>
+            </a:r>
+            <a:endParaRPr lang="en-US" dirty="0" smtClean="0"/>
           </a:p>
           <a:p>
             <a:r>
@@ -6298,7 +6708,7 @@
           <a:p>
             <a:r>
               <a:rPr lang="en-US" dirty="0" smtClean="0"/>
-              <a:t>Will it be superseded by “standard” Android UI Testing Framework?</a:t>
+              <a:t>Will it complement or be superseded by “standard” Android UI Testing Framework?</a:t>
             </a:r>
             <a:endParaRPr lang="en-US" dirty="0"/>
           </a:p>
@@ -6371,27 +6781,42 @@
           <a:p>
             <a:r>
               <a:rPr lang="en-US" dirty="0" smtClean="0"/>
-              <a:t>Requires Device</a:t>
+              <a:t>Requires </a:t>
+            </a:r>
+            <a:r>
+              <a:rPr lang="en-US" dirty="0" smtClean="0"/>
+              <a:t>Device</a:t>
             </a:r>
           </a:p>
           <a:p>
             <a:pPr lvl="1"/>
             <a:r>
               <a:rPr lang="en-US" dirty="0" smtClean="0"/>
+              <a:t>Complex to setup.</a:t>
+            </a:r>
+            <a:endParaRPr lang="en-US" dirty="0" smtClean="0"/>
+          </a:p>
+          <a:p>
+            <a:pPr lvl="1"/>
+            <a:r>
+              <a:rPr lang="en-US" dirty="0" smtClean="0"/>
               <a:t>Difficult to configure on build server!</a:t>
             </a:r>
           </a:p>
           <a:p>
             <a:r>
               <a:rPr lang="en-US" dirty="0" smtClean="0"/>
-              <a:t>Requires separate test project</a:t>
-            </a:r>
-          </a:p>
-          <a:p>
-            <a:r>
-              <a:rPr lang="en-US" dirty="0" smtClean="0"/>
-              <a:t>More suited to functional/black-box testing</a:t>
-            </a:r>
+              <a:t>More </a:t>
+            </a:r>
+            <a:r>
+              <a:rPr lang="en-US" dirty="0" smtClean="0"/>
+              <a:t>suited to functional/black-box </a:t>
+            </a:r>
+            <a:r>
+              <a:rPr lang="en-US" dirty="0" smtClean="0"/>
+              <a:t>testing for a variety of target devices.</a:t>
+            </a:r>
+            <a:endParaRPr lang="en-US" dirty="0" smtClean="0"/>
           </a:p>
           <a:p>
             <a:r>
@@ -6480,22 +6905,11 @@
           <a:p>
             <a:r>
               <a:rPr lang="en-US" dirty="0" smtClean="0"/>
-              <a:t>Why did we choose </a:t>
-            </a:r>
-            <a:r>
-              <a:rPr lang="en-US" dirty="0" err="1" smtClean="0"/>
-              <a:t>Robolectric</a:t>
-            </a:r>
-            <a:r>
-              <a:rPr lang="en-US" dirty="0" smtClean="0"/>
-              <a:t>?</a:t>
-            </a:r>
-          </a:p>
-          <a:p>
-            <a:pPr lvl="1"/>
-            <a:r>
-              <a:rPr lang="en-US" dirty="0" smtClean="0"/>
-              <a:t>Write standard </a:t>
+              <a:t>Write </a:t>
+            </a:r>
+            <a:r>
+              <a:rPr lang="en-US" dirty="0" smtClean="0"/>
+              <a:t>standard </a:t>
             </a:r>
             <a:r>
               <a:rPr lang="en-US" dirty="0" err="1" smtClean="0"/>
@@ -6507,24 +6921,24 @@
             </a:r>
           </a:p>
           <a:p>
-            <a:pPr lvl="1"/>
-            <a:r>
-              <a:rPr lang="en-US" dirty="0" smtClean="0"/>
-              <a:t>Run on any JVM, without the emulator</a:t>
-            </a:r>
-          </a:p>
-          <a:p>
-            <a:pPr lvl="1"/>
-            <a:r>
-              <a:rPr lang="en-US" dirty="0" smtClean="0"/>
-              <a:t>Tests can be in same project as source code (when using Ant/Maven to build)</a:t>
-            </a:r>
-          </a:p>
-          <a:p>
-            <a:pPr lvl="1"/>
-            <a:r>
-              <a:rPr lang="en-US" dirty="0" smtClean="0"/>
-              <a:t>Relatively easy to configure on build server</a:t>
+            <a:r>
+              <a:rPr lang="en-US" dirty="0" smtClean="0"/>
+              <a:t>Run on any JVM, without </a:t>
+            </a:r>
+            <a:r>
+              <a:rPr lang="en-US" dirty="0" smtClean="0"/>
+              <a:t>needing the emulator or a device</a:t>
+            </a:r>
+            <a:endParaRPr lang="en-US" dirty="0" smtClean="0"/>
+          </a:p>
+          <a:p>
+            <a:r>
+              <a:rPr lang="en-US" dirty="0" smtClean="0"/>
+              <a:t>Relatively </a:t>
+            </a:r>
+            <a:r>
+              <a:rPr lang="en-US" dirty="0" smtClean="0"/>
+              <a:t>easy to configure on build server</a:t>
             </a:r>
           </a:p>
         </p:txBody>

</xml_diff>